<commit_message>
Update file paths chapter to include relative file paths
Discussed in #34

Still a WIP
</commit_message>
<xml_diff>
--- a/img/03_part_data_transfer/02_file_paths/file_paths.pptx
+++ b/img/03_part_data_transfer/02_file_paths/file_paths.pptx
@@ -5,16 +5,20 @@
     <p:sldMasterId id="2147483648" r:id="rId1"/>
   </p:sldMasterIdLst>
   <p:notesMasterIdLst>
-    <p:notesMasterId r:id="rId9"/>
+    <p:notesMasterId r:id="rId13"/>
   </p:notesMasterIdLst>
   <p:sldIdLst>
-    <p:sldId id="265" r:id="rId2"/>
-    <p:sldId id="266" r:id="rId3"/>
-    <p:sldId id="273" r:id="rId4"/>
-    <p:sldId id="274" r:id="rId5"/>
-    <p:sldId id="275" r:id="rId6"/>
-    <p:sldId id="276" r:id="rId7"/>
-    <p:sldId id="277" r:id="rId8"/>
+    <p:sldId id="263" r:id="rId2"/>
+    <p:sldId id="303" r:id="rId3"/>
+    <p:sldId id="265" r:id="rId4"/>
+    <p:sldId id="266" r:id="rId5"/>
+    <p:sldId id="273" r:id="rId6"/>
+    <p:sldId id="274" r:id="rId7"/>
+    <p:sldId id="275" r:id="rId8"/>
+    <p:sldId id="276" r:id="rId9"/>
+    <p:sldId id="277" r:id="rId10"/>
+    <p:sldId id="304" r:id="rId11"/>
+    <p:sldId id="305" r:id="rId12"/>
   </p:sldIdLst>
   <p:sldSz cx="24384000" cy="13716000"/>
   <p:notesSz cx="6858000" cy="9144000"/>
@@ -409,9 +413,9 @@
         <a:spcPct val="125000"/>
       </a:lnSpc>
       <a:defRPr sz="2400">
-        <a:latin typeface="Avenir Roman"/>
-        <a:ea typeface="Avenir Roman"/>
-        <a:cs typeface="Avenir Roman"/>
+        <a:latin typeface="Avenir"/>
+        <a:ea typeface="Avenir"/>
+        <a:cs typeface="Avenir"/>
         <a:sym typeface="Avenir Roman"/>
       </a:defRPr>
     </a:lvl1pPr>
@@ -420,9 +424,9 @@
         <a:spcPct val="125000"/>
       </a:lnSpc>
       <a:defRPr sz="2400">
-        <a:latin typeface="Avenir Roman"/>
-        <a:ea typeface="Avenir Roman"/>
-        <a:cs typeface="Avenir Roman"/>
+        <a:latin typeface="Avenir"/>
+        <a:ea typeface="Avenir"/>
+        <a:cs typeface="Avenir"/>
         <a:sym typeface="Avenir Roman"/>
       </a:defRPr>
     </a:lvl2pPr>
@@ -431,9 +435,9 @@
         <a:spcPct val="125000"/>
       </a:lnSpc>
       <a:defRPr sz="2400">
-        <a:latin typeface="Avenir Roman"/>
-        <a:ea typeface="Avenir Roman"/>
-        <a:cs typeface="Avenir Roman"/>
+        <a:latin typeface="Avenir"/>
+        <a:ea typeface="Avenir"/>
+        <a:cs typeface="Avenir"/>
         <a:sym typeface="Avenir Roman"/>
       </a:defRPr>
     </a:lvl3pPr>
@@ -442,9 +446,9 @@
         <a:spcPct val="125000"/>
       </a:lnSpc>
       <a:defRPr sz="2400">
-        <a:latin typeface="Avenir Roman"/>
-        <a:ea typeface="Avenir Roman"/>
-        <a:cs typeface="Avenir Roman"/>
+        <a:latin typeface="Avenir"/>
+        <a:ea typeface="Avenir"/>
+        <a:cs typeface="Avenir"/>
         <a:sym typeface="Avenir Roman"/>
       </a:defRPr>
     </a:lvl4pPr>
@@ -453,9 +457,9 @@
         <a:spcPct val="125000"/>
       </a:lnSpc>
       <a:defRPr sz="2400">
-        <a:latin typeface="Avenir Roman"/>
-        <a:ea typeface="Avenir Roman"/>
-        <a:cs typeface="Avenir Roman"/>
+        <a:latin typeface="Avenir"/>
+        <a:ea typeface="Avenir"/>
+        <a:cs typeface="Avenir"/>
         <a:sym typeface="Avenir Roman"/>
       </a:defRPr>
     </a:lvl5pPr>
@@ -464,9 +468,9 @@
         <a:spcPct val="125000"/>
       </a:lnSpc>
       <a:defRPr sz="2400">
-        <a:latin typeface="Avenir Roman"/>
-        <a:ea typeface="Avenir Roman"/>
-        <a:cs typeface="Avenir Roman"/>
+        <a:latin typeface="Avenir"/>
+        <a:ea typeface="Avenir"/>
+        <a:cs typeface="Avenir"/>
         <a:sym typeface="Avenir Roman"/>
       </a:defRPr>
     </a:lvl6pPr>
@@ -475,9 +479,9 @@
         <a:spcPct val="125000"/>
       </a:lnSpc>
       <a:defRPr sz="2400">
-        <a:latin typeface="Avenir Roman"/>
-        <a:ea typeface="Avenir Roman"/>
-        <a:cs typeface="Avenir Roman"/>
+        <a:latin typeface="Avenir"/>
+        <a:ea typeface="Avenir"/>
+        <a:cs typeface="Avenir"/>
         <a:sym typeface="Avenir Roman"/>
       </a:defRPr>
     </a:lvl7pPr>
@@ -486,9 +490,9 @@
         <a:spcPct val="125000"/>
       </a:lnSpc>
       <a:defRPr sz="2400">
-        <a:latin typeface="Avenir Roman"/>
-        <a:ea typeface="Avenir Roman"/>
-        <a:cs typeface="Avenir Roman"/>
+        <a:latin typeface="Avenir"/>
+        <a:ea typeface="Avenir"/>
+        <a:cs typeface="Avenir"/>
         <a:sym typeface="Avenir Roman"/>
       </a:defRPr>
     </a:lvl8pPr>
@@ -497,9 +501,9 @@
         <a:spcPct val="125000"/>
       </a:lnSpc>
       <a:defRPr sz="2400">
-        <a:latin typeface="Avenir Roman"/>
-        <a:ea typeface="Avenir Roman"/>
-        <a:cs typeface="Avenir Roman"/>
+        <a:latin typeface="Avenir"/>
+        <a:ea typeface="Avenir"/>
+        <a:cs typeface="Avenir"/>
         <a:sym typeface="Avenir Roman"/>
       </a:defRPr>
     </a:lvl9pPr>
@@ -3292,6 +3296,389 @@
           <a:chExt cx="0" cy="0"/>
         </a:xfrm>
       </p:grpSpPr>
+      <p:sp>
+        <p:nvSpPr>
+          <p:cNvPr id="2" name="Title 1">
+            <a:extLst>
+              <a:ext uri="{FF2B5EF4-FFF2-40B4-BE49-F238E27FC236}">
+                <a16:creationId xmlns:a16="http://schemas.microsoft.com/office/drawing/2014/main" id="{DFE3139E-47FE-794A-87BC-EEB37DC60E5A}"/>
+              </a:ext>
+            </a:extLst>
+          </p:cNvPr>
+          <p:cNvSpPr>
+            <a:spLocks noGrp="1"/>
+          </p:cNvSpPr>
+          <p:nvPr>
+            <p:ph type="title"/>
+          </p:nvPr>
+        </p:nvSpPr>
+        <p:spPr/>
+        <p:txBody>
+          <a:bodyPr>
+            <a:normAutofit fontScale="90000"/>
+          </a:bodyPr>
+          <a:lstStyle/>
+          <a:p>
+            <a:r>
+              <a:rPr lang="en-US" dirty="0"/>
+              <a:t>This slide deck is not a presentation. It’s to export diagrams and images in an image format for use in markdown files.</a:t>
+            </a:r>
+          </a:p>
+        </p:txBody>
+      </p:sp>
+    </p:spTree>
+    <p:extLst>
+      <p:ext uri="{BB962C8B-B14F-4D97-AF65-F5344CB8AC3E}">
+        <p14:creationId xmlns:p14="http://schemas.microsoft.com/office/powerpoint/2010/main" val="2939317786"/>
+      </p:ext>
+    </p:extLst>
+  </p:cSld>
+  <p:clrMapOvr>
+    <a:masterClrMapping/>
+  </p:clrMapOvr>
+  <p:transition spd="med"/>
+</p:sld>
+</file>
+
+<file path=ppt/slides/slide10.xml><?xml version="1.0" encoding="utf-8"?>
+<p:sld xmlns:a="http://schemas.openxmlformats.org/drawingml/2006/main" xmlns:r="http://schemas.openxmlformats.org/officeDocument/2006/relationships" xmlns:p="http://schemas.openxmlformats.org/presentationml/2006/main">
+  <p:cSld>
+    <p:spTree>
+      <p:nvGrpSpPr>
+        <p:cNvPr id="1" name=""/>
+        <p:cNvGrpSpPr/>
+        <p:nvPr/>
+      </p:nvGrpSpPr>
+      <p:grpSpPr>
+        <a:xfrm>
+          <a:off x="0" y="0"/>
+          <a:ext cx="0" cy="0"/>
+          <a:chOff x="0" y="0"/>
+          <a:chExt cx="0" cy="0"/>
+        </a:xfrm>
+      </p:grpSpPr>
+      <p:pic>
+        <p:nvPicPr>
+          <p:cNvPr id="5" name="Picture 4" descr="A screenshot of a computer&#10;&#10;Description automatically generated with medium confidence">
+            <a:extLst>
+              <a:ext uri="{FF2B5EF4-FFF2-40B4-BE49-F238E27FC236}">
+                <a16:creationId xmlns:a16="http://schemas.microsoft.com/office/drawing/2014/main" id="{6D527CE8-B37F-1689-28E1-C90653D9B2CB}"/>
+              </a:ext>
+            </a:extLst>
+          </p:cNvPr>
+          <p:cNvPicPr>
+            <a:picLocks noChangeAspect="1"/>
+          </p:cNvPicPr>
+          <p:nvPr/>
+        </p:nvPicPr>
+        <p:blipFill>
+          <a:blip r:embed="rId2">
+            <a:extLst>
+              <a:ext uri="{28A0092B-C50C-407E-A947-70E740481C1C}">
+                <a14:useLocalDpi xmlns:a14="http://schemas.microsoft.com/office/drawing/2010/main" val="0"/>
+              </a:ext>
+            </a:extLst>
+          </a:blip>
+          <a:stretch>
+            <a:fillRect/>
+          </a:stretch>
+        </p:blipFill>
+        <p:spPr>
+          <a:xfrm>
+            <a:off x="15506" y="744279"/>
+            <a:ext cx="24352989" cy="12227442"/>
+          </a:xfrm>
+          <a:prstGeom prst="rect">
+            <a:avLst/>
+          </a:prstGeom>
+        </p:spPr>
+      </p:pic>
+    </p:spTree>
+    <p:extLst>
+      <p:ext uri="{BB962C8B-B14F-4D97-AF65-F5344CB8AC3E}">
+        <p14:creationId xmlns:p14="http://schemas.microsoft.com/office/powerpoint/2010/main" val="2365024177"/>
+      </p:ext>
+    </p:extLst>
+  </p:cSld>
+  <p:clrMapOvr>
+    <a:masterClrMapping/>
+  </p:clrMapOvr>
+  <p:transition spd="med"/>
+</p:sld>
+</file>
+
+<file path=ppt/slides/slide11.xml><?xml version="1.0" encoding="utf-8"?>
+<p:sld xmlns:a="http://schemas.openxmlformats.org/drawingml/2006/main" xmlns:r="http://schemas.openxmlformats.org/officeDocument/2006/relationships" xmlns:p="http://schemas.openxmlformats.org/presentationml/2006/main">
+  <p:cSld>
+    <p:spTree>
+      <p:nvGrpSpPr>
+        <p:cNvPr id="1" name=""/>
+        <p:cNvGrpSpPr/>
+        <p:nvPr/>
+      </p:nvGrpSpPr>
+      <p:grpSpPr>
+        <a:xfrm>
+          <a:off x="0" y="0"/>
+          <a:ext cx="0" cy="0"/>
+          <a:chOff x="0" y="0"/>
+          <a:chExt cx="0" cy="0"/>
+        </a:xfrm>
+      </p:grpSpPr>
+      <p:pic>
+        <p:nvPicPr>
+          <p:cNvPr id="3" name="Picture 2" descr="Graphical user interface, application&#10;&#10;Description automatically generated">
+            <a:extLst>
+              <a:ext uri="{FF2B5EF4-FFF2-40B4-BE49-F238E27FC236}">
+                <a16:creationId xmlns:a16="http://schemas.microsoft.com/office/drawing/2014/main" id="{D2477ED5-2E84-4CF4-9D24-43BDA39C7B47}"/>
+              </a:ext>
+            </a:extLst>
+          </p:cNvPr>
+          <p:cNvPicPr>
+            <a:picLocks noChangeAspect="1"/>
+          </p:cNvPicPr>
+          <p:nvPr/>
+        </p:nvPicPr>
+        <p:blipFill>
+          <a:blip r:embed="rId2">
+            <a:extLst>
+              <a:ext uri="{28A0092B-C50C-407E-A947-70E740481C1C}">
+                <a14:useLocalDpi xmlns:a14="http://schemas.microsoft.com/office/drawing/2010/main" val="0"/>
+              </a:ext>
+            </a:extLst>
+          </a:blip>
+          <a:stretch>
+            <a:fillRect/>
+          </a:stretch>
+        </p:blipFill>
+        <p:spPr>
+          <a:xfrm>
+            <a:off x="-26717" y="2014152"/>
+            <a:ext cx="24437434" cy="9687697"/>
+          </a:xfrm>
+          <a:prstGeom prst="rect">
+            <a:avLst/>
+          </a:prstGeom>
+        </p:spPr>
+      </p:pic>
+    </p:spTree>
+    <p:extLst>
+      <p:ext uri="{BB962C8B-B14F-4D97-AF65-F5344CB8AC3E}">
+        <p14:creationId xmlns:p14="http://schemas.microsoft.com/office/powerpoint/2010/main" val="944144817"/>
+      </p:ext>
+    </p:extLst>
+  </p:cSld>
+  <p:clrMapOvr>
+    <a:masterClrMapping/>
+  </p:clrMapOvr>
+  <p:transition spd="med"/>
+</p:sld>
+</file>
+
+<file path=ppt/slides/slide2.xml><?xml version="1.0" encoding="utf-8"?>
+<p:sld xmlns:a="http://schemas.openxmlformats.org/drawingml/2006/main" xmlns:r="http://schemas.openxmlformats.org/officeDocument/2006/relationships" xmlns:p="http://schemas.openxmlformats.org/presentationml/2006/main">
+  <p:cSld>
+    <p:spTree>
+      <p:nvGrpSpPr>
+        <p:cNvPr id="1" name=""/>
+        <p:cNvGrpSpPr/>
+        <p:nvPr/>
+      </p:nvGrpSpPr>
+      <p:grpSpPr>
+        <a:xfrm>
+          <a:off x="0" y="0"/>
+          <a:ext cx="0" cy="0"/>
+          <a:chOff x="0" y="0"/>
+          <a:chExt cx="0" cy="0"/>
+        </a:xfrm>
+      </p:grpSpPr>
+      <p:sp>
+        <p:nvSpPr>
+          <p:cNvPr id="2" name="Text Placeholder 1">
+            <a:extLst>
+              <a:ext uri="{FF2B5EF4-FFF2-40B4-BE49-F238E27FC236}">
+                <a16:creationId xmlns:a16="http://schemas.microsoft.com/office/drawing/2014/main" id="{4D079679-F53D-ED4A-888A-EE4BADF07CAB}"/>
+              </a:ext>
+            </a:extLst>
+          </p:cNvPr>
+          <p:cNvSpPr>
+            <a:spLocks noGrp="1"/>
+          </p:cNvSpPr>
+          <p:nvPr>
+            <p:ph type="body" idx="1"/>
+          </p:nvPr>
+        </p:nvSpPr>
+        <p:spPr/>
+        <p:txBody>
+          <a:bodyPr anchor="t"/>
+          <a:lstStyle/>
+          <a:p>
+            <a:r>
+              <a:rPr lang="en-US" dirty="0"/>
+              <a:t>Create the graphic on a blank slide</a:t>
+            </a:r>
+          </a:p>
+          <a:p>
+            <a:r>
+              <a:rPr lang="en-US" dirty="0"/>
+              <a:t>Select the slide</a:t>
+            </a:r>
+          </a:p>
+          <a:p>
+            <a:r>
+              <a:rPr lang="en-US" dirty="0"/>
+              <a:t>Click File -&gt; Export</a:t>
+            </a:r>
+          </a:p>
+          <a:p>
+            <a:r>
+              <a:rPr lang="en-US" dirty="0"/>
+              <a:t>Name the file, select the directory to export it to</a:t>
+            </a:r>
+          </a:p>
+          <a:p>
+            <a:pPr lvl="1"/>
+            <a:r>
+              <a:rPr lang="en-US" dirty="0"/>
+              <a:t>lesson_number order_brief </a:t>
+            </a:r>
+            <a:r>
+              <a:rPr lang="en-US" dirty="0" err="1"/>
+              <a:t>description.png</a:t>
+            </a:r>
+            <a:endParaRPr lang="en-US" dirty="0"/>
+          </a:p>
+          <a:p>
+            <a:r>
+              <a:rPr lang="en-US" dirty="0"/>
+              <a:t>Change the file format to PNG</a:t>
+            </a:r>
+          </a:p>
+          <a:p>
+            <a:r>
+              <a:rPr lang="en-US" dirty="0"/>
+              <a:t>Set the dimensions to 1800 </a:t>
+            </a:r>
+            <a:r>
+              <a:rPr lang="en-US"/>
+              <a:t>x 1013</a:t>
+            </a:r>
+            <a:endParaRPr lang="en-US" dirty="0"/>
+          </a:p>
+        </p:txBody>
+      </p:sp>
+      <p:sp>
+        <p:nvSpPr>
+          <p:cNvPr id="3" name="TextBox 2">
+            <a:extLst>
+              <a:ext uri="{FF2B5EF4-FFF2-40B4-BE49-F238E27FC236}">
+                <a16:creationId xmlns:a16="http://schemas.microsoft.com/office/drawing/2014/main" id="{BD4D79AF-91A5-114F-BECA-B360BE26530B}"/>
+              </a:ext>
+            </a:extLst>
+          </p:cNvPr>
+          <p:cNvSpPr txBox="1"/>
+          <p:nvPr/>
+        </p:nvSpPr>
+        <p:spPr>
+          <a:xfrm>
+            <a:off x="1270000" y="351383"/>
+            <a:ext cx="3987800" cy="872034"/>
+          </a:xfrm>
+          <a:prstGeom prst="rect">
+            <a:avLst/>
+          </a:prstGeom>
+          <a:noFill/>
+          <a:ln w="12700" cap="flat">
+            <a:noFill/>
+            <a:miter lim="400000"/>
+          </a:ln>
+          <a:effectLst/>
+          <a:sp3d/>
+        </p:spPr>
+        <p:style>
+          <a:lnRef idx="0">
+            <a:scrgbClr r="0" g="0" b="0"/>
+          </a:lnRef>
+          <a:fillRef idx="0">
+            <a:scrgbClr r="0" g="0" b="0"/>
+          </a:fillRef>
+          <a:effectRef idx="0">
+            <a:scrgbClr r="0" g="0" b="0"/>
+          </a:effectRef>
+          <a:fontRef idx="none"/>
+        </p:style>
+        <p:txBody>
+          <a:bodyPr rot="0" spcFirstLastPara="1" vertOverflow="overflow" horzOverflow="overflow" vert="horz" wrap="square" lIns="50800" tIns="50800" rIns="50800" bIns="50800" numCol="1" spcCol="38100" rtlCol="0" anchor="ctr">
+            <a:spAutoFit/>
+          </a:bodyPr>
+          <a:lstStyle/>
+          <a:p>
+            <a:pPr marL="0" marR="0" indent="0" algn="ctr" defTabSz="825500" rtl="0" fontAlgn="auto" latinLnBrk="0" hangingPunct="0">
+              <a:lnSpc>
+                <a:spcPct val="100000"/>
+              </a:lnSpc>
+              <a:spcBef>
+                <a:spcPts val="0"/>
+              </a:spcBef>
+              <a:spcAft>
+                <a:spcPts val="0"/>
+              </a:spcAft>
+              <a:buClrTx/>
+              <a:buSzTx/>
+              <a:buFontTx/>
+              <a:buNone/>
+              <a:tabLst/>
+            </a:pPr>
+            <a:r>
+              <a:rPr kumimoji="0" lang="en-US" sz="5000" b="0" i="0" u="none" strike="noStrike" cap="none" spc="0" normalizeH="0" baseline="0" dirty="0">
+                <a:ln>
+                  <a:noFill/>
+                </a:ln>
+                <a:solidFill>
+                  <a:srgbClr val="000000"/>
+                </a:solidFill>
+                <a:effectLst/>
+                <a:uFillTx/>
+                <a:latin typeface="+mn-lt"/>
+                <a:ea typeface="+mn-ea"/>
+                <a:cs typeface="+mn-cs"/>
+                <a:sym typeface="Helvetica Light"/>
+              </a:rPr>
+              <a:t>Instructions</a:t>
+            </a:r>
+          </a:p>
+        </p:txBody>
+      </p:sp>
+    </p:spTree>
+    <p:extLst>
+      <p:ext uri="{BB962C8B-B14F-4D97-AF65-F5344CB8AC3E}">
+        <p14:creationId xmlns:p14="http://schemas.microsoft.com/office/powerpoint/2010/main" val="1264864497"/>
+      </p:ext>
+    </p:extLst>
+  </p:cSld>
+  <p:clrMapOvr>
+    <a:masterClrMapping/>
+  </p:clrMapOvr>
+  <p:transition spd="med"/>
+</p:sld>
+</file>
+
+<file path=ppt/slides/slide3.xml><?xml version="1.0" encoding="utf-8"?>
+<p:sld xmlns:a="http://schemas.openxmlformats.org/drawingml/2006/main" xmlns:r="http://schemas.openxmlformats.org/officeDocument/2006/relationships" xmlns:p="http://schemas.openxmlformats.org/presentationml/2006/main">
+  <p:cSld>
+    <p:spTree>
+      <p:nvGrpSpPr>
+        <p:cNvPr id="1" name=""/>
+        <p:cNvGrpSpPr/>
+        <p:nvPr/>
+      </p:nvGrpSpPr>
+      <p:grpSpPr>
+        <a:xfrm>
+          <a:off x="0" y="0"/>
+          <a:ext cx="0" cy="0"/>
+          <a:chOff x="0" y="0"/>
+          <a:chExt cx="0" cy="0"/>
+        </a:xfrm>
+      </p:grpSpPr>
       <p:pic>
         <p:nvPicPr>
           <p:cNvPr id="195" name="store-icon.png" descr="store-icon.png"/>
@@ -3328,7 +3715,7 @@
 </p:sld>
 </file>
 
-<file path=ppt/slides/slide2.xml><?xml version="1.0" encoding="utf-8"?>
+<file path=ppt/slides/slide4.xml><?xml version="1.0" encoding="utf-8"?>
 <p:sld xmlns:a="http://schemas.openxmlformats.org/drawingml/2006/main" xmlns:r="http://schemas.openxmlformats.org/officeDocument/2006/relationships" xmlns:p="http://schemas.openxmlformats.org/presentationml/2006/main">
   <p:cSld>
     <p:spTree>
@@ -3517,7 +3904,7 @@
 </p:sld>
 </file>
 
-<file path=ppt/slides/slide3.xml><?xml version="1.0" encoding="utf-8"?>
+<file path=ppt/slides/slide5.xml><?xml version="1.0" encoding="utf-8"?>
 <p:sld xmlns:a="http://schemas.openxmlformats.org/drawingml/2006/main" xmlns:r="http://schemas.openxmlformats.org/officeDocument/2006/relationships" xmlns:p="http://schemas.openxmlformats.org/presentationml/2006/main">
   <p:cSld>
     <p:spTree>
@@ -4494,7 +4881,7 @@
 </p:sld>
 </file>
 
-<file path=ppt/slides/slide4.xml><?xml version="1.0" encoding="utf-8"?>
+<file path=ppt/slides/slide6.xml><?xml version="1.0" encoding="utf-8"?>
 <p:sld xmlns:a="http://schemas.openxmlformats.org/drawingml/2006/main" xmlns:r="http://schemas.openxmlformats.org/officeDocument/2006/relationships" xmlns:p="http://schemas.openxmlformats.org/presentationml/2006/main">
   <p:cSld>
     <p:spTree>
@@ -4561,7 +4948,7 @@
 </p:sld>
 </file>
 
-<file path=ppt/slides/slide5.xml><?xml version="1.0" encoding="utf-8"?>
+<file path=ppt/slides/slide7.xml><?xml version="1.0" encoding="utf-8"?>
 <p:sld xmlns:a="http://schemas.openxmlformats.org/drawingml/2006/main" xmlns:r="http://schemas.openxmlformats.org/officeDocument/2006/relationships" xmlns:p="http://schemas.openxmlformats.org/presentationml/2006/main">
   <p:cSld>
     <p:spTree>
@@ -4628,7 +5015,7 @@
 </p:sld>
 </file>
 
-<file path=ppt/slides/slide6.xml><?xml version="1.0" encoding="utf-8"?>
+<file path=ppt/slides/slide8.xml><?xml version="1.0" encoding="utf-8"?>
 <p:sld xmlns:a="http://schemas.openxmlformats.org/drawingml/2006/main" xmlns:r="http://schemas.openxmlformats.org/officeDocument/2006/relationships" xmlns:p="http://schemas.openxmlformats.org/presentationml/2006/main">
   <p:cSld>
     <p:spTree>
@@ -4695,7 +5082,7 @@
 </p:sld>
 </file>
 
-<file path=ppt/slides/slide7.xml><?xml version="1.0" encoding="utf-8"?>
+<file path=ppt/slides/slide9.xml><?xml version="1.0" encoding="utf-8"?>
 <p:sld xmlns:a="http://schemas.openxmlformats.org/drawingml/2006/main" xmlns:r="http://schemas.openxmlformats.org/officeDocument/2006/relationships" xmlns:p="http://schemas.openxmlformats.org/presentationml/2006/main">
   <p:cSld>
     <p:spTree>

</xml_diff>

<commit_message>
Update file paths chapter to include language about relative paths
Discussed in #34
</commit_message>
<xml_diff>
--- a/img/03_part_data_transfer/02_file_paths/file_paths.pptx
+++ b/img/03_part_data_transfer/02_file_paths/file_paths.pptx
@@ -5,7 +5,7 @@
     <p:sldMasterId id="2147483648" r:id="rId1"/>
   </p:sldMasterIdLst>
   <p:notesMasterIdLst>
-    <p:notesMasterId r:id="rId13"/>
+    <p:notesMasterId r:id="rId18"/>
   </p:notesMasterIdLst>
   <p:sldIdLst>
     <p:sldId id="263" r:id="rId2"/>
@@ -19,6 +19,11 @@
     <p:sldId id="277" r:id="rId10"/>
     <p:sldId id="304" r:id="rId11"/>
     <p:sldId id="305" r:id="rId12"/>
+    <p:sldId id="354" r:id="rId13"/>
+    <p:sldId id="351" r:id="rId14"/>
+    <p:sldId id="352" r:id="rId15"/>
+    <p:sldId id="356" r:id="rId16"/>
+    <p:sldId id="355" r:id="rId17"/>
   </p:sldIdLst>
   <p:sldSz cx="24384000" cy="13716000"/>
   <p:notesSz cx="6858000" cy="9144000"/>
@@ -590,6 +595,431 @@
 </p:notes>
 </file>
 
+<file path=ppt/notesSlides/notesSlide10.xml><?xml version="1.0" encoding="utf-8"?>
+<p:notes xmlns:a="http://schemas.openxmlformats.org/drawingml/2006/main" xmlns:r="http://schemas.openxmlformats.org/officeDocument/2006/relationships" xmlns:p="http://schemas.openxmlformats.org/presentationml/2006/main">
+  <p:cSld>
+    <p:spTree>
+      <p:nvGrpSpPr>
+        <p:cNvPr id="1" name=""/>
+        <p:cNvGrpSpPr/>
+        <p:nvPr/>
+      </p:nvGrpSpPr>
+      <p:grpSpPr>
+        <a:xfrm>
+          <a:off x="0" y="0"/>
+          <a:ext cx="0" cy="0"/>
+          <a:chOff x="0" y="0"/>
+          <a:chExt cx="0" cy="0"/>
+        </a:xfrm>
+      </p:grpSpPr>
+      <p:sp>
+        <p:nvSpPr>
+          <p:cNvPr id="202" name="Shape 202"/>
+          <p:cNvSpPr>
+            <a:spLocks noGrp="1" noRot="1" noChangeAspect="1"/>
+          </p:cNvSpPr>
+          <p:nvPr>
+            <p:ph type="sldImg"/>
+          </p:nvPr>
+        </p:nvSpPr>
+        <p:spPr>
+          <a:xfrm>
+            <a:off x="381000" y="685800"/>
+            <a:ext cx="6096000" cy="3429000"/>
+          </a:xfrm>
+          <a:prstGeom prst="rect">
+            <a:avLst/>
+          </a:prstGeom>
+        </p:spPr>
+        <p:txBody>
+          <a:bodyPr/>
+          <a:lstStyle/>
+          <a:p>
+            <a:endParaRPr/>
+          </a:p>
+        </p:txBody>
+      </p:sp>
+      <p:sp>
+        <p:nvSpPr>
+          <p:cNvPr id="203" name="Shape 203"/>
+          <p:cNvSpPr>
+            <a:spLocks noGrp="1"/>
+          </p:cNvSpPr>
+          <p:nvPr>
+            <p:ph type="body" sz="quarter" idx="1"/>
+          </p:nvPr>
+        </p:nvSpPr>
+        <p:spPr>
+          <a:prstGeom prst="rect">
+            <a:avLst/>
+          </a:prstGeom>
+        </p:spPr>
+        <p:txBody>
+          <a:bodyPr/>
+          <a:lstStyle/>
+          <a:p>
+            <a:r>
+              <a:rPr lang="en-US" dirty="0"/>
+              <a:t>directions</a:t>
+            </a:r>
+            <a:endParaRPr dirty="0"/>
+          </a:p>
+        </p:txBody>
+      </p:sp>
+    </p:spTree>
+    <p:extLst>
+      <p:ext uri="{BB962C8B-B14F-4D97-AF65-F5344CB8AC3E}">
+        <p14:creationId xmlns:p14="http://schemas.microsoft.com/office/powerpoint/2010/main" val="527786333"/>
+      </p:ext>
+    </p:extLst>
+  </p:cSld>
+  <p:clrMapOvr>
+    <a:masterClrMapping/>
+  </p:clrMapOvr>
+</p:notes>
+</file>
+
+<file path=ppt/notesSlides/notesSlide11.xml><?xml version="1.0" encoding="utf-8"?>
+<p:notes xmlns:a="http://schemas.openxmlformats.org/drawingml/2006/main" xmlns:r="http://schemas.openxmlformats.org/officeDocument/2006/relationships" xmlns:p="http://schemas.openxmlformats.org/presentationml/2006/main">
+  <p:cSld>
+    <p:spTree>
+      <p:nvGrpSpPr>
+        <p:cNvPr id="1" name=""/>
+        <p:cNvGrpSpPr/>
+        <p:nvPr/>
+      </p:nvGrpSpPr>
+      <p:grpSpPr>
+        <a:xfrm>
+          <a:off x="0" y="0"/>
+          <a:ext cx="0" cy="0"/>
+          <a:chOff x="0" y="0"/>
+          <a:chExt cx="0" cy="0"/>
+        </a:xfrm>
+      </p:grpSpPr>
+      <p:sp>
+        <p:nvSpPr>
+          <p:cNvPr id="2" name="Slide Image Placeholder 1"/>
+          <p:cNvSpPr>
+            <a:spLocks noGrp="1" noRot="1" noChangeAspect="1"/>
+          </p:cNvSpPr>
+          <p:nvPr>
+            <p:ph type="sldImg"/>
+          </p:nvPr>
+        </p:nvSpPr>
+        <p:spPr>
+          <a:xfrm>
+            <a:off x="381000" y="685800"/>
+            <a:ext cx="6096000" cy="3429000"/>
+          </a:xfrm>
+        </p:spPr>
+      </p:sp>
+      <p:sp>
+        <p:nvSpPr>
+          <p:cNvPr id="3" name="Notes Placeholder 2"/>
+          <p:cNvSpPr>
+            <a:spLocks noGrp="1"/>
+          </p:cNvSpPr>
+          <p:nvPr>
+            <p:ph type="body" idx="1"/>
+          </p:nvPr>
+        </p:nvSpPr>
+        <p:spPr/>
+        <p:txBody>
+          <a:bodyPr/>
+          <a:lstStyle/>
+          <a:p>
+            <a:pPr marL="0" marR="0" lvl="0" indent="0" defTabSz="457200" eaLnBrk="1" fontAlgn="auto" latinLnBrk="0" hangingPunct="1">
+              <a:lnSpc>
+                <a:spcPct val="125000"/>
+              </a:lnSpc>
+              <a:spcBef>
+                <a:spcPts val="0"/>
+              </a:spcBef>
+              <a:spcAft>
+                <a:spcPts val="0"/>
+              </a:spcAft>
+              <a:buClrTx/>
+              <a:buSzTx/>
+              <a:buFontTx/>
+              <a:buNone/>
+              <a:tabLst/>
+              <a:defRPr/>
+            </a:pPr>
+            <a:r>
+              <a:rPr lang="en-US" dirty="0"/>
+              <a:t>relative_file_paths_03_check_project</a:t>
+            </a:r>
+          </a:p>
+          <a:p>
+            <a:endParaRPr lang="en-US" dirty="0"/>
+          </a:p>
+        </p:txBody>
+      </p:sp>
+    </p:spTree>
+    <p:extLst>
+      <p:ext uri="{BB962C8B-B14F-4D97-AF65-F5344CB8AC3E}">
+        <p14:creationId xmlns:p14="http://schemas.microsoft.com/office/powerpoint/2010/main" val="3076114697"/>
+      </p:ext>
+    </p:extLst>
+  </p:cSld>
+  <p:clrMapOvr>
+    <a:masterClrMapping/>
+  </p:clrMapOvr>
+</p:notes>
+</file>
+
+<file path=ppt/notesSlides/notesSlide12.xml><?xml version="1.0" encoding="utf-8"?>
+<p:notes xmlns:a="http://schemas.openxmlformats.org/drawingml/2006/main" xmlns:r="http://schemas.openxmlformats.org/officeDocument/2006/relationships" xmlns:p="http://schemas.openxmlformats.org/presentationml/2006/main">
+  <p:cSld>
+    <p:spTree>
+      <p:nvGrpSpPr>
+        <p:cNvPr id="1" name=""/>
+        <p:cNvGrpSpPr/>
+        <p:nvPr/>
+      </p:nvGrpSpPr>
+      <p:grpSpPr>
+        <a:xfrm>
+          <a:off x="0" y="0"/>
+          <a:ext cx="0" cy="0"/>
+          <a:chOff x="0" y="0"/>
+          <a:chExt cx="0" cy="0"/>
+        </a:xfrm>
+      </p:grpSpPr>
+      <p:sp>
+        <p:nvSpPr>
+          <p:cNvPr id="2" name="Slide Image Placeholder 1"/>
+          <p:cNvSpPr>
+            <a:spLocks noGrp="1" noRot="1" noChangeAspect="1"/>
+          </p:cNvSpPr>
+          <p:nvPr>
+            <p:ph type="sldImg"/>
+          </p:nvPr>
+        </p:nvSpPr>
+        <p:spPr>
+          <a:xfrm>
+            <a:off x="381000" y="685800"/>
+            <a:ext cx="6096000" cy="3429000"/>
+          </a:xfrm>
+        </p:spPr>
+      </p:sp>
+      <p:sp>
+        <p:nvSpPr>
+          <p:cNvPr id="3" name="Notes Placeholder 2"/>
+          <p:cNvSpPr>
+            <a:spLocks noGrp="1"/>
+          </p:cNvSpPr>
+          <p:nvPr>
+            <p:ph type="body" idx="1"/>
+          </p:nvPr>
+        </p:nvSpPr>
+        <p:spPr/>
+        <p:txBody>
+          <a:bodyPr/>
+          <a:lstStyle/>
+          <a:p>
+            <a:pPr marL="0" marR="0" lvl="0" indent="0" defTabSz="457200" eaLnBrk="1" fontAlgn="auto" latinLnBrk="0" hangingPunct="1">
+              <a:lnSpc>
+                <a:spcPct val="125000"/>
+              </a:lnSpc>
+              <a:spcBef>
+                <a:spcPts val="0"/>
+              </a:spcBef>
+              <a:spcAft>
+                <a:spcPts val="0"/>
+              </a:spcAft>
+              <a:buClrTx/>
+              <a:buSzTx/>
+              <a:buFontTx/>
+              <a:buNone/>
+              <a:tabLst/>
+              <a:defRPr/>
+            </a:pPr>
+            <a:r>
+              <a:rPr lang="en-US" dirty="0"/>
+              <a:t>relative_file_paths_04_check_files</a:t>
+            </a:r>
+          </a:p>
+          <a:p>
+            <a:endParaRPr lang="en-US" dirty="0"/>
+          </a:p>
+        </p:txBody>
+      </p:sp>
+    </p:spTree>
+    <p:extLst>
+      <p:ext uri="{BB962C8B-B14F-4D97-AF65-F5344CB8AC3E}">
+        <p14:creationId xmlns:p14="http://schemas.microsoft.com/office/powerpoint/2010/main" val="238390159"/>
+      </p:ext>
+    </p:extLst>
+  </p:cSld>
+  <p:clrMapOvr>
+    <a:masterClrMapping/>
+  </p:clrMapOvr>
+</p:notes>
+</file>
+
+<file path=ppt/notesSlides/notesSlide13.xml><?xml version="1.0" encoding="utf-8"?>
+<p:notes xmlns:a="http://schemas.openxmlformats.org/drawingml/2006/main" xmlns:r="http://schemas.openxmlformats.org/officeDocument/2006/relationships" xmlns:p="http://schemas.openxmlformats.org/presentationml/2006/main">
+  <p:cSld>
+    <p:spTree>
+      <p:nvGrpSpPr>
+        <p:cNvPr id="1" name=""/>
+        <p:cNvGrpSpPr/>
+        <p:nvPr/>
+      </p:nvGrpSpPr>
+      <p:grpSpPr>
+        <a:xfrm>
+          <a:off x="0" y="0"/>
+          <a:ext cx="0" cy="0"/>
+          <a:chOff x="0" y="0"/>
+          <a:chExt cx="0" cy="0"/>
+        </a:xfrm>
+      </p:grpSpPr>
+      <p:sp>
+        <p:nvSpPr>
+          <p:cNvPr id="2" name="Slide Image Placeholder 1"/>
+          <p:cNvSpPr>
+            <a:spLocks noGrp="1" noRot="1" noChangeAspect="1"/>
+          </p:cNvSpPr>
+          <p:nvPr>
+            <p:ph type="sldImg"/>
+          </p:nvPr>
+        </p:nvSpPr>
+        <p:spPr>
+          <a:xfrm>
+            <a:off x="381000" y="685800"/>
+            <a:ext cx="6096000" cy="3429000"/>
+          </a:xfrm>
+        </p:spPr>
+      </p:sp>
+      <p:sp>
+        <p:nvSpPr>
+          <p:cNvPr id="3" name="Notes Placeholder 2"/>
+          <p:cNvSpPr>
+            <a:spLocks noGrp="1"/>
+          </p:cNvSpPr>
+          <p:nvPr>
+            <p:ph type="body" idx="1"/>
+          </p:nvPr>
+        </p:nvSpPr>
+        <p:spPr/>
+        <p:txBody>
+          <a:bodyPr/>
+          <a:lstStyle/>
+          <a:p>
+            <a:pPr marL="0" marR="0" lvl="0" indent="0" defTabSz="457200" eaLnBrk="1" fontAlgn="auto" latinLnBrk="0" hangingPunct="1">
+              <a:lnSpc>
+                <a:spcPct val="125000"/>
+              </a:lnSpc>
+              <a:spcBef>
+                <a:spcPts val="0"/>
+              </a:spcBef>
+              <a:spcAft>
+                <a:spcPts val="0"/>
+              </a:spcAft>
+              <a:buClrTx/>
+              <a:buSzTx/>
+              <a:buFontTx/>
+              <a:buNone/>
+              <a:tabLst/>
+              <a:defRPr/>
+            </a:pPr>
+            <a:r>
+              <a:rPr lang="en-US" dirty="0"/>
+              <a:t>relative_file_paths_05_relative_path_brad</a:t>
+            </a:r>
+          </a:p>
+        </p:txBody>
+      </p:sp>
+    </p:spTree>
+    <p:extLst>
+      <p:ext uri="{BB962C8B-B14F-4D97-AF65-F5344CB8AC3E}">
+        <p14:creationId xmlns:p14="http://schemas.microsoft.com/office/powerpoint/2010/main" val="1153150426"/>
+      </p:ext>
+    </p:extLst>
+  </p:cSld>
+  <p:clrMapOvr>
+    <a:masterClrMapping/>
+  </p:clrMapOvr>
+</p:notes>
+</file>
+
+<file path=ppt/notesSlides/notesSlide14.xml><?xml version="1.0" encoding="utf-8"?>
+<p:notes xmlns:a="http://schemas.openxmlformats.org/drawingml/2006/main" xmlns:r="http://schemas.openxmlformats.org/officeDocument/2006/relationships" xmlns:p="http://schemas.openxmlformats.org/presentationml/2006/main">
+  <p:cSld>
+    <p:spTree>
+      <p:nvGrpSpPr>
+        <p:cNvPr id="1" name=""/>
+        <p:cNvGrpSpPr/>
+        <p:nvPr/>
+      </p:nvGrpSpPr>
+      <p:grpSpPr>
+        <a:xfrm>
+          <a:off x="0" y="0"/>
+          <a:ext cx="0" cy="0"/>
+          <a:chOff x="0" y="0"/>
+          <a:chExt cx="0" cy="0"/>
+        </a:xfrm>
+      </p:grpSpPr>
+      <p:sp>
+        <p:nvSpPr>
+          <p:cNvPr id="2" name="Slide Image Placeholder 1"/>
+          <p:cNvSpPr>
+            <a:spLocks noGrp="1" noRot="1" noChangeAspect="1"/>
+          </p:cNvSpPr>
+          <p:nvPr>
+            <p:ph type="sldImg"/>
+          </p:nvPr>
+        </p:nvSpPr>
+        <p:spPr>
+          <a:xfrm>
+            <a:off x="381000" y="685800"/>
+            <a:ext cx="6096000" cy="3429000"/>
+          </a:xfrm>
+        </p:spPr>
+      </p:sp>
+      <p:sp>
+        <p:nvSpPr>
+          <p:cNvPr id="3" name="Notes Placeholder 2"/>
+          <p:cNvSpPr>
+            <a:spLocks noGrp="1"/>
+          </p:cNvSpPr>
+          <p:nvPr>
+            <p:ph type="body" idx="1"/>
+          </p:nvPr>
+        </p:nvSpPr>
+        <p:spPr/>
+        <p:txBody>
+          <a:bodyPr/>
+          <a:lstStyle/>
+          <a:p>
+            <a:r>
+              <a:rPr lang="en-US" dirty="0"/>
+              <a:t>relative_file_paths</a:t>
+            </a:r>
+            <a:r>
+              <a:rPr lang="en-US"/>
+              <a:t>_06_</a:t>
+            </a:r>
+            <a:r>
+              <a:rPr lang="en-US" dirty="0"/>
+              <a:t>relative_path_arthur</a:t>
+            </a:r>
+          </a:p>
+        </p:txBody>
+      </p:sp>
+    </p:spTree>
+    <p:extLst>
+      <p:ext uri="{BB962C8B-B14F-4D97-AF65-F5344CB8AC3E}">
+        <p14:creationId xmlns:p14="http://schemas.microsoft.com/office/powerpoint/2010/main" val="1515075861"/>
+      </p:ext>
+    </p:extLst>
+  </p:cSld>
+  <p:clrMapOvr>
+    <a:masterClrMapping/>
+  </p:clrMapOvr>
+</p:notes>
+</file>
+
 <file path=ppt/notesSlides/notesSlide2.xml><?xml version="1.0" encoding="utf-8"?>
 <p:notes xmlns:a="http://schemas.openxmlformats.org/drawingml/2006/main" xmlns:r="http://schemas.openxmlformats.org/officeDocument/2006/relationships" xmlns:p="http://schemas.openxmlformats.org/presentationml/2006/main">
   <p:cSld>
@@ -1008,6 +1438,164 @@
     <p:extLst>
       <p:ext uri="{BB962C8B-B14F-4D97-AF65-F5344CB8AC3E}">
         <p14:creationId xmlns:p14="http://schemas.microsoft.com/office/powerpoint/2010/main" val="2277618583"/>
+      </p:ext>
+    </p:extLst>
+  </p:cSld>
+  <p:clrMapOvr>
+    <a:masterClrMapping/>
+  </p:clrMapOvr>
+</p:notes>
+</file>
+
+<file path=ppt/notesSlides/notesSlide8.xml><?xml version="1.0" encoding="utf-8"?>
+<p:notes xmlns:a="http://schemas.openxmlformats.org/drawingml/2006/main" xmlns:r="http://schemas.openxmlformats.org/officeDocument/2006/relationships" xmlns:p="http://schemas.openxmlformats.org/presentationml/2006/main">
+  <p:cSld>
+    <p:spTree>
+      <p:nvGrpSpPr>
+        <p:cNvPr id="1" name=""/>
+        <p:cNvGrpSpPr/>
+        <p:nvPr/>
+      </p:nvGrpSpPr>
+      <p:grpSpPr>
+        <a:xfrm>
+          <a:off x="0" y="0"/>
+          <a:ext cx="0" cy="0"/>
+          <a:chOff x="0" y="0"/>
+          <a:chExt cx="0" cy="0"/>
+        </a:xfrm>
+      </p:grpSpPr>
+      <p:sp>
+        <p:nvSpPr>
+          <p:cNvPr id="2" name="Slide Image Placeholder 1"/>
+          <p:cNvSpPr>
+            <a:spLocks noGrp="1" noRot="1" noChangeAspect="1"/>
+          </p:cNvSpPr>
+          <p:nvPr>
+            <p:ph type="sldImg"/>
+          </p:nvPr>
+        </p:nvSpPr>
+        <p:spPr>
+          <a:xfrm>
+            <a:off x="381000" y="685800"/>
+            <a:ext cx="6096000" cy="3429000"/>
+          </a:xfrm>
+        </p:spPr>
+      </p:sp>
+      <p:sp>
+        <p:nvSpPr>
+          <p:cNvPr id="3" name="Notes Placeholder 2"/>
+          <p:cNvSpPr>
+            <a:spLocks noGrp="1"/>
+          </p:cNvSpPr>
+          <p:nvPr>
+            <p:ph type="body" idx="1"/>
+          </p:nvPr>
+        </p:nvSpPr>
+        <p:spPr/>
+        <p:txBody>
+          <a:bodyPr/>
+          <a:lstStyle/>
+          <a:p>
+            <a:r>
+              <a:rPr lang="en-US" dirty="0"/>
+              <a:t>relative_file_paths_01_absolute_brad</a:t>
+            </a:r>
+          </a:p>
+        </p:txBody>
+      </p:sp>
+    </p:spTree>
+    <p:extLst>
+      <p:ext uri="{BB962C8B-B14F-4D97-AF65-F5344CB8AC3E}">
+        <p14:creationId xmlns:p14="http://schemas.microsoft.com/office/powerpoint/2010/main" val="73575628"/>
+      </p:ext>
+    </p:extLst>
+  </p:cSld>
+  <p:clrMapOvr>
+    <a:masterClrMapping/>
+  </p:clrMapOvr>
+</p:notes>
+</file>
+
+<file path=ppt/notesSlides/notesSlide9.xml><?xml version="1.0" encoding="utf-8"?>
+<p:notes xmlns:a="http://schemas.openxmlformats.org/drawingml/2006/main" xmlns:r="http://schemas.openxmlformats.org/officeDocument/2006/relationships" xmlns:p="http://schemas.openxmlformats.org/presentationml/2006/main">
+  <p:cSld>
+    <p:spTree>
+      <p:nvGrpSpPr>
+        <p:cNvPr id="1" name=""/>
+        <p:cNvGrpSpPr/>
+        <p:nvPr/>
+      </p:nvGrpSpPr>
+      <p:grpSpPr>
+        <a:xfrm>
+          <a:off x="0" y="0"/>
+          <a:ext cx="0" cy="0"/>
+          <a:chOff x="0" y="0"/>
+          <a:chExt cx="0" cy="0"/>
+        </a:xfrm>
+      </p:grpSpPr>
+      <p:sp>
+        <p:nvSpPr>
+          <p:cNvPr id="2" name="Slide Image Placeholder 1"/>
+          <p:cNvSpPr>
+            <a:spLocks noGrp="1" noRot="1" noChangeAspect="1"/>
+          </p:cNvSpPr>
+          <p:nvPr>
+            <p:ph type="sldImg"/>
+          </p:nvPr>
+        </p:nvSpPr>
+        <p:spPr>
+          <a:xfrm>
+            <a:off x="381000" y="685800"/>
+            <a:ext cx="6096000" cy="3429000"/>
+          </a:xfrm>
+        </p:spPr>
+      </p:sp>
+      <p:sp>
+        <p:nvSpPr>
+          <p:cNvPr id="3" name="Notes Placeholder 2"/>
+          <p:cNvSpPr>
+            <a:spLocks noGrp="1"/>
+          </p:cNvSpPr>
+          <p:nvPr>
+            <p:ph type="body" idx="1"/>
+          </p:nvPr>
+        </p:nvSpPr>
+        <p:spPr/>
+        <p:txBody>
+          <a:bodyPr/>
+          <a:lstStyle/>
+          <a:p>
+            <a:pPr marL="0" marR="0" lvl="0" indent="0" defTabSz="457200" eaLnBrk="1" fontAlgn="auto" latinLnBrk="0" hangingPunct="1">
+              <a:lnSpc>
+                <a:spcPct val="125000"/>
+              </a:lnSpc>
+              <a:spcBef>
+                <a:spcPts val="0"/>
+              </a:spcBef>
+              <a:spcAft>
+                <a:spcPts val="0"/>
+              </a:spcAft>
+              <a:buClrTx/>
+              <a:buSzTx/>
+              <a:buFontTx/>
+              <a:buNone/>
+              <a:tabLst/>
+              <a:defRPr/>
+            </a:pPr>
+            <a:r>
+              <a:rPr lang="en-US" dirty="0"/>
+              <a:t>relative_file_paths_02_absolute_arthur</a:t>
+            </a:r>
+          </a:p>
+          <a:p>
+            <a:endParaRPr lang="en-US" dirty="0"/>
+          </a:p>
+        </p:txBody>
+      </p:sp>
+    </p:spTree>
+    <p:extLst>
+      <p:ext uri="{BB962C8B-B14F-4D97-AF65-F5344CB8AC3E}">
+        <p14:creationId xmlns:p14="http://schemas.microsoft.com/office/powerpoint/2010/main" val="353112870"/>
       </p:ext>
     </p:extLst>
   </p:cSld>
@@ -2432,7 +3020,7 @@
           </a:ln>
           <a:extLst>
             <a:ext uri="{C572A759-6A51-4108-AA02-DFA0A04FC94B}">
-              <ma14:wrappingTextBoxFlag xmlns="" xmlns:m="http://schemas.openxmlformats.org/officeDocument/2006/math" xmlns:a14="http://schemas.microsoft.com/office/drawing/2010/main" xmlns:ma14="http://schemas.microsoft.com/office/mac/drawingml/2011/main" val="1"/>
+              <ma14:wrappingTextBoxFlag xmlns:ma14="http://schemas.microsoft.com/office/mac/drawingml/2011/main" xmlns:a14="http://schemas.microsoft.com/office/drawing/2010/main" xmlns:m="http://schemas.openxmlformats.org/officeDocument/2006/math" xmlns="" val="1"/>
             </a:ext>
           </a:extLst>
         </p:spPr>
@@ -2471,7 +3059,7 @@
           </a:ln>
           <a:extLst>
             <a:ext uri="{C572A759-6A51-4108-AA02-DFA0A04FC94B}">
-              <ma14:wrappingTextBoxFlag xmlns="" xmlns:m="http://schemas.openxmlformats.org/officeDocument/2006/math" xmlns:a14="http://schemas.microsoft.com/office/drawing/2010/main" xmlns:ma14="http://schemas.microsoft.com/office/mac/drawingml/2011/main" val="1"/>
+              <ma14:wrappingTextBoxFlag xmlns:ma14="http://schemas.microsoft.com/office/mac/drawingml/2011/main" xmlns:a14="http://schemas.microsoft.com/office/drawing/2010/main" xmlns:m="http://schemas.openxmlformats.org/officeDocument/2006/math" xmlns="" val="1"/>
             </a:ext>
           </a:extLst>
         </p:spPr>
@@ -3359,10 +3947,10 @@
       </p:grpSpPr>
       <p:pic>
         <p:nvPicPr>
-          <p:cNvPr id="5" name="Picture 4" descr="A screenshot of a computer&#10;&#10;Description automatically generated with medium confidence">
+          <p:cNvPr id="3" name="Picture 2" descr="A screenshot of a computer&#10;&#10;Description automatically generated with medium confidence">
             <a:extLst>
               <a:ext uri="{FF2B5EF4-FFF2-40B4-BE49-F238E27FC236}">
-                <a16:creationId xmlns:a16="http://schemas.microsoft.com/office/drawing/2014/main" id="{6D527CE8-B37F-1689-28E1-C90653D9B2CB}"/>
+                <a16:creationId xmlns:a16="http://schemas.microsoft.com/office/drawing/2014/main" id="{68426054-CE7F-417D-4895-D64C406F7BAE}"/>
               </a:ext>
             </a:extLst>
           </p:cNvPr>
@@ -3372,7 +3960,7 @@
           <p:nvPr/>
         </p:nvPicPr>
         <p:blipFill>
-          <a:blip r:embed="rId2">
+          <a:blip r:embed="rId3">
             <a:extLst>
               <a:ext uri="{28A0092B-C50C-407E-A947-70E740481C1C}">
                 <a14:useLocalDpi xmlns:a14="http://schemas.microsoft.com/office/drawing/2010/main" val="0"/>
@@ -3385,8 +3973,8 @@
         </p:blipFill>
         <p:spPr>
           <a:xfrm>
-            <a:off x="15506" y="744279"/>
-            <a:ext cx="24352989" cy="12227442"/>
+            <a:off x="28892" y="1084217"/>
+            <a:ext cx="24326216" cy="11547566"/>
           </a:xfrm>
           <a:prstGeom prst="rect">
             <a:avLst/>
@@ -3426,10 +4014,10 @@
       </p:grpSpPr>
       <p:pic>
         <p:nvPicPr>
-          <p:cNvPr id="3" name="Picture 2" descr="Graphical user interface, application&#10;&#10;Description automatically generated">
+          <p:cNvPr id="4" name="Picture 3">
             <a:extLst>
               <a:ext uri="{FF2B5EF4-FFF2-40B4-BE49-F238E27FC236}">
-                <a16:creationId xmlns:a16="http://schemas.microsoft.com/office/drawing/2014/main" id="{D2477ED5-2E84-4CF4-9D24-43BDA39C7B47}"/>
+                <a16:creationId xmlns:a16="http://schemas.microsoft.com/office/drawing/2014/main" id="{E4F1264A-1F48-2DB1-7082-0A92164A799E}"/>
               </a:ext>
             </a:extLst>
           </p:cNvPr>
@@ -3439,7 +4027,7 @@
           <p:nvPr/>
         </p:nvPicPr>
         <p:blipFill>
-          <a:blip r:embed="rId2">
+          <a:blip r:embed="rId3">
             <a:extLst>
               <a:ext uri="{28A0092B-C50C-407E-A947-70E740481C1C}">
                 <a14:useLocalDpi xmlns:a14="http://schemas.microsoft.com/office/drawing/2010/main" val="0"/>
@@ -3452,8 +4040,8 @@
         </p:blipFill>
         <p:spPr>
           <a:xfrm>
-            <a:off x="-26717" y="2014152"/>
-            <a:ext cx="24437434" cy="9687697"/>
+            <a:off x="-11277" y="2961409"/>
+            <a:ext cx="24406554" cy="7793182"/>
           </a:xfrm>
           <a:prstGeom prst="rect">
             <a:avLst/>
@@ -3464,6 +4052,1373 @@
     <p:extLst>
       <p:ext uri="{BB962C8B-B14F-4D97-AF65-F5344CB8AC3E}">
         <p14:creationId xmlns:p14="http://schemas.microsoft.com/office/powerpoint/2010/main" val="944144817"/>
+      </p:ext>
+    </p:extLst>
+  </p:cSld>
+  <p:clrMapOvr>
+    <a:masterClrMapping/>
+  </p:clrMapOvr>
+  <p:transition spd="med"/>
+</p:sld>
+</file>
+
+<file path=ppt/slides/slide12.xml><?xml version="1.0" encoding="utf-8"?>
+<p:sld xmlns:a="http://schemas.openxmlformats.org/drawingml/2006/main" xmlns:r="http://schemas.openxmlformats.org/officeDocument/2006/relationships" xmlns:p="http://schemas.openxmlformats.org/presentationml/2006/main">
+  <p:cSld>
+    <p:spTree>
+      <p:nvGrpSpPr>
+        <p:cNvPr id="1" name=""/>
+        <p:cNvGrpSpPr/>
+        <p:nvPr/>
+      </p:nvGrpSpPr>
+      <p:grpSpPr>
+        <a:xfrm>
+          <a:off x="0" y="0"/>
+          <a:ext cx="0" cy="0"/>
+          <a:chOff x="0" y="0"/>
+          <a:chExt cx="0" cy="0"/>
+        </a:xfrm>
+      </p:grpSpPr>
+      <p:pic>
+        <p:nvPicPr>
+          <p:cNvPr id="199" name="store-icon.png" descr="store-icon.png"/>
+          <p:cNvPicPr>
+            <a:picLocks noChangeAspect="1"/>
+          </p:cNvPicPr>
+          <p:nvPr/>
+        </p:nvPicPr>
+        <p:blipFill>
+          <a:blip r:embed="rId3"/>
+          <a:stretch>
+            <a:fillRect/>
+          </a:stretch>
+        </p:blipFill>
+        <p:spPr>
+          <a:xfrm>
+            <a:off x="0" y="489591"/>
+            <a:ext cx="12559146" cy="12559144"/>
+          </a:xfrm>
+          <a:prstGeom prst="rect">
+            <a:avLst/>
+          </a:prstGeom>
+          <a:ln w="12700">
+            <a:miter lim="400000"/>
+          </a:ln>
+        </p:spPr>
+      </p:pic>
+      <p:sp>
+        <p:nvSpPr>
+          <p:cNvPr id="200" name="Right on Camp Bowie Blvd.…"/>
+          <p:cNvSpPr txBox="1"/>
+          <p:nvPr/>
+        </p:nvSpPr>
+        <p:spPr>
+          <a:xfrm>
+            <a:off x="14525688" y="4498380"/>
+            <a:ext cx="9618360" cy="4719241"/>
+          </a:xfrm>
+          <a:prstGeom prst="rect">
+            <a:avLst/>
+          </a:prstGeom>
+          <a:ln w="12700">
+            <a:miter lim="400000"/>
+          </a:ln>
+          <a:extLst>
+            <a:ext uri="{C572A759-6A51-4108-AA02-DFA0A04FC94B}">
+              <ma14:wrappingTextBoxFlag xmlns:ma14="http://schemas.microsoft.com/office/mac/drawingml/2011/main" xmlns:a14="http://schemas.microsoft.com/office/drawing/2010/main" xmlns:m="http://schemas.openxmlformats.org/officeDocument/2006/math" xmlns="" val="1"/>
+            </a:ext>
+          </a:extLst>
+        </p:spPr>
+        <p:txBody>
+          <a:bodyPr lIns="50800" tIns="50800" rIns="50800" bIns="50800" anchor="ctr">
+            <a:spAutoFit/>
+          </a:bodyPr>
+          <a:lstStyle/>
+          <a:p>
+            <a:pPr marL="854807" indent="-854807" algn="l">
+              <a:buSzPct val="100000"/>
+              <a:buAutoNum type="arabicPeriod"/>
+            </a:pPr>
+            <a:r>
+              <a:rPr lang="en-US" dirty="0"/>
+              <a:t>Start at the corner of Camp Bowie Blvd. and </a:t>
+            </a:r>
+            <a:r>
+              <a:rPr lang="en-US" dirty="0" err="1"/>
+              <a:t>Hulen</a:t>
+            </a:r>
+            <a:r>
+              <a:rPr lang="en-US" dirty="0"/>
+              <a:t> St.</a:t>
+            </a:r>
+          </a:p>
+          <a:p>
+            <a:pPr marL="854807" indent="-854807" algn="l">
+              <a:buSzPct val="100000"/>
+              <a:buAutoNum type="arabicPeriod"/>
+            </a:pPr>
+            <a:r>
+              <a:rPr dirty="0"/>
+              <a:t>Drive .5 mile</a:t>
+            </a:r>
+          </a:p>
+          <a:p>
+            <a:pPr marL="854807" indent="-854807" algn="l">
+              <a:buSzPct val="100000"/>
+              <a:buAutoNum type="arabicPeriod"/>
+            </a:pPr>
+            <a:r>
+              <a:rPr dirty="0"/>
+              <a:t>Cross I-30</a:t>
+            </a:r>
+          </a:p>
+          <a:p>
+            <a:pPr marL="854807" indent="-854807" algn="l">
+              <a:buSzPct val="100000"/>
+              <a:buAutoNum type="arabicPeriod"/>
+            </a:pPr>
+            <a:r>
+              <a:rPr dirty="0"/>
+              <a:t>Turn right at second parking lot entrance</a:t>
+            </a:r>
+          </a:p>
+        </p:txBody>
+      </p:sp>
+      <p:sp>
+        <p:nvSpPr>
+          <p:cNvPr id="201" name="Arrow"/>
+          <p:cNvSpPr/>
+          <p:nvPr/>
+        </p:nvSpPr>
+        <p:spPr>
+          <a:xfrm>
+            <a:off x="11813060" y="5905499"/>
+            <a:ext cx="2651088" cy="1905001"/>
+          </a:xfrm>
+          <a:prstGeom prst="rightArrow">
+            <a:avLst>
+              <a:gd name="adj1" fmla="val 32000"/>
+              <a:gd name="adj2" fmla="val 64000"/>
+            </a:avLst>
+          </a:prstGeom>
+          <a:solidFill>
+            <a:srgbClr val="C00000"/>
+          </a:solidFill>
+          <a:ln w="25400">
+            <a:solidFill>
+              <a:srgbClr val="C00000"/>
+            </a:solidFill>
+            <a:miter lim="400000"/>
+          </a:ln>
+        </p:spPr>
+        <p:txBody>
+          <a:bodyPr lIns="50800" tIns="50800" rIns="50800" bIns="50800" anchor="ctr"/>
+          <a:lstStyle/>
+          <a:p>
+            <a:pPr>
+              <a:defRPr sz="3200"/>
+            </a:pPr>
+            <a:endParaRPr/>
+          </a:p>
+        </p:txBody>
+      </p:sp>
+    </p:spTree>
+    <p:extLst>
+      <p:ext uri="{BB962C8B-B14F-4D97-AF65-F5344CB8AC3E}">
+        <p14:creationId xmlns:p14="http://schemas.microsoft.com/office/powerpoint/2010/main" val="2327016896"/>
+      </p:ext>
+    </p:extLst>
+  </p:cSld>
+  <p:clrMapOvr>
+    <a:masterClrMapping/>
+  </p:clrMapOvr>
+  <p:transition spd="med"/>
+</p:sld>
+</file>
+
+<file path=ppt/slides/slide13.xml><?xml version="1.0" encoding="utf-8"?>
+<p:sld xmlns:a="http://schemas.openxmlformats.org/drawingml/2006/main" xmlns:r="http://schemas.openxmlformats.org/officeDocument/2006/relationships" xmlns:p="http://schemas.openxmlformats.org/presentationml/2006/main">
+  <p:cSld>
+    <p:spTree>
+      <p:nvGrpSpPr>
+        <p:cNvPr id="1" name=""/>
+        <p:cNvGrpSpPr/>
+        <p:nvPr/>
+      </p:nvGrpSpPr>
+      <p:grpSpPr>
+        <a:xfrm>
+          <a:off x="0" y="0"/>
+          <a:ext cx="0" cy="0"/>
+          <a:chOff x="0" y="0"/>
+          <a:chExt cx="0" cy="0"/>
+        </a:xfrm>
+      </p:grpSpPr>
+      <p:pic>
+        <p:nvPicPr>
+          <p:cNvPr id="3" name="Picture 2" descr="Graphical user interface, application&#10;&#10;Description automatically generated">
+            <a:extLst>
+              <a:ext uri="{FF2B5EF4-FFF2-40B4-BE49-F238E27FC236}">
+                <a16:creationId xmlns:a16="http://schemas.microsoft.com/office/drawing/2014/main" id="{0C370098-FDEF-B9B1-AF4C-798F5BDBA3AD}"/>
+              </a:ext>
+            </a:extLst>
+          </p:cNvPr>
+          <p:cNvPicPr>
+            <a:picLocks noChangeAspect="1"/>
+          </p:cNvPicPr>
+          <p:nvPr/>
+        </p:nvPicPr>
+        <p:blipFill>
+          <a:blip r:embed="rId3">
+            <a:extLst>
+              <a:ext uri="{28A0092B-C50C-407E-A947-70E740481C1C}">
+                <a14:useLocalDpi xmlns:a14="http://schemas.microsoft.com/office/drawing/2010/main" val="0"/>
+              </a:ext>
+            </a:extLst>
+          </a:blip>
+          <a:stretch>
+            <a:fillRect/>
+          </a:stretch>
+        </p:blipFill>
+        <p:spPr>
+          <a:xfrm>
+            <a:off x="32336" y="4918842"/>
+            <a:ext cx="24319329" cy="3878317"/>
+          </a:xfrm>
+          <a:prstGeom prst="rect">
+            <a:avLst/>
+          </a:prstGeom>
+        </p:spPr>
+      </p:pic>
+      <p:sp>
+        <p:nvSpPr>
+          <p:cNvPr id="4" name="Left Arrow 3">
+            <a:extLst>
+              <a:ext uri="{FF2B5EF4-FFF2-40B4-BE49-F238E27FC236}">
+                <a16:creationId xmlns:a16="http://schemas.microsoft.com/office/drawing/2014/main" id="{7FD1C8A1-D3A3-76BB-900E-5864C8C48618}"/>
+              </a:ext>
+            </a:extLst>
+          </p:cNvPr>
+          <p:cNvSpPr/>
+          <p:nvPr/>
+        </p:nvSpPr>
+        <p:spPr>
+          <a:xfrm rot="13404828">
+            <a:off x="14401798" y="2057399"/>
+            <a:ext cx="4927600" cy="2438400"/>
+          </a:xfrm>
+          <a:prstGeom prst="leftArrow">
+            <a:avLst/>
+          </a:prstGeom>
+          <a:solidFill>
+            <a:schemeClr val="accent5"/>
+          </a:solidFill>
+          <a:ln w="12700" cap="flat">
+            <a:solidFill>
+              <a:schemeClr val="accent5"/>
+            </a:solidFill>
+            <a:miter lim="400000"/>
+          </a:ln>
+          <a:effectLst>
+            <a:outerShdw blurRad="38100" dist="25400" dir="5400000" rotWithShape="0">
+              <a:srgbClr val="000000">
+                <a:alpha val="50000"/>
+              </a:srgbClr>
+            </a:outerShdw>
+          </a:effectLst>
+          <a:sp3d/>
+        </p:spPr>
+        <p:style>
+          <a:lnRef idx="0">
+            <a:scrgbClr r="0" g="0" b="0"/>
+          </a:lnRef>
+          <a:fillRef idx="0">
+            <a:scrgbClr r="0" g="0" b="0"/>
+          </a:fillRef>
+          <a:effectRef idx="0">
+            <a:scrgbClr r="0" g="0" b="0"/>
+          </a:effectRef>
+          <a:fontRef idx="none"/>
+        </p:style>
+        <p:txBody>
+          <a:bodyPr rot="0" spcFirstLastPara="1" vertOverflow="overflow" horzOverflow="overflow" vert="horz" wrap="square" lIns="50800" tIns="50800" rIns="50800" bIns="50800" numCol="1" spcCol="38100" rtlCol="0" anchor="ctr">
+            <a:spAutoFit/>
+          </a:bodyPr>
+          <a:lstStyle/>
+          <a:p>
+            <a:pPr marL="0" marR="0" indent="0" algn="ctr" defTabSz="825500" rtl="0" fontAlgn="auto" latinLnBrk="0" hangingPunct="0">
+              <a:lnSpc>
+                <a:spcPct val="100000"/>
+              </a:lnSpc>
+              <a:spcBef>
+                <a:spcPts val="0"/>
+              </a:spcBef>
+              <a:spcAft>
+                <a:spcPts val="0"/>
+              </a:spcAft>
+              <a:buClrTx/>
+              <a:buSzTx/>
+              <a:buFontTx/>
+              <a:buNone/>
+              <a:tabLst/>
+            </a:pPr>
+            <a:endParaRPr kumimoji="0" lang="en-US" sz="3200" i="0" u="none" strike="noStrike" normalizeH="0" baseline="0">
+              <a:solidFill>
+                <a:srgbClr val="FFFFFF"/>
+              </a:solidFill>
+              <a:uFillTx/>
+              <a:latin typeface="+mn-lt"/>
+              <a:ea typeface="+mn-ea"/>
+              <a:cs typeface="+mn-cs"/>
+              <a:sym typeface="Helvetica Light"/>
+            </a:endParaRPr>
+          </a:p>
+        </p:txBody>
+      </p:sp>
+    </p:spTree>
+    <p:extLst>
+      <p:ext uri="{BB962C8B-B14F-4D97-AF65-F5344CB8AC3E}">
+        <p14:creationId xmlns:p14="http://schemas.microsoft.com/office/powerpoint/2010/main" val="4088429981"/>
+      </p:ext>
+    </p:extLst>
+  </p:cSld>
+  <p:clrMapOvr>
+    <a:masterClrMapping/>
+  </p:clrMapOvr>
+  <p:transition spd="med"/>
+</p:sld>
+</file>
+
+<file path=ppt/slides/slide14.xml><?xml version="1.0" encoding="utf-8"?>
+<p:sld xmlns:a="http://schemas.openxmlformats.org/drawingml/2006/main" xmlns:r="http://schemas.openxmlformats.org/officeDocument/2006/relationships" xmlns:p="http://schemas.openxmlformats.org/presentationml/2006/main">
+  <p:cSld>
+    <p:spTree>
+      <p:nvGrpSpPr>
+        <p:cNvPr id="1" name=""/>
+        <p:cNvGrpSpPr/>
+        <p:nvPr/>
+      </p:nvGrpSpPr>
+      <p:grpSpPr>
+        <a:xfrm>
+          <a:off x="0" y="0"/>
+          <a:ext cx="0" cy="0"/>
+          <a:chOff x="0" y="0"/>
+          <a:chExt cx="0" cy="0"/>
+        </a:xfrm>
+      </p:grpSpPr>
+      <p:pic>
+        <p:nvPicPr>
+          <p:cNvPr id="12" name="Picture 11" descr="Graphical user interface, text&#10;&#10;Description automatically generated">
+            <a:extLst>
+              <a:ext uri="{FF2B5EF4-FFF2-40B4-BE49-F238E27FC236}">
+                <a16:creationId xmlns:a16="http://schemas.microsoft.com/office/drawing/2014/main" id="{367D5C8A-DD38-ACD4-20EC-B00EE97730F8}"/>
+              </a:ext>
+            </a:extLst>
+          </p:cNvPr>
+          <p:cNvPicPr>
+            <a:picLocks noChangeAspect="1"/>
+          </p:cNvPicPr>
+          <p:nvPr/>
+        </p:nvPicPr>
+        <p:blipFill>
+          <a:blip r:embed="rId3">
+            <a:extLst>
+              <a:ext uri="{28A0092B-C50C-407E-A947-70E740481C1C}">
+                <a14:useLocalDpi xmlns:a14="http://schemas.microsoft.com/office/drawing/2010/main" val="0"/>
+              </a:ext>
+            </a:extLst>
+          </a:blip>
+          <a:stretch>
+            <a:fillRect/>
+          </a:stretch>
+        </p:blipFill>
+        <p:spPr>
+          <a:xfrm>
+            <a:off x="-4450" y="382772"/>
+            <a:ext cx="24388450" cy="12950456"/>
+          </a:xfrm>
+          <a:prstGeom prst="rect">
+            <a:avLst/>
+          </a:prstGeom>
+        </p:spPr>
+      </p:pic>
+      <p:sp>
+        <p:nvSpPr>
+          <p:cNvPr id="4" name="Rectangle 3">
+            <a:extLst>
+              <a:ext uri="{FF2B5EF4-FFF2-40B4-BE49-F238E27FC236}">
+                <a16:creationId xmlns:a16="http://schemas.microsoft.com/office/drawing/2014/main" id="{6B9CFCE8-1A4D-FFAE-7C40-12957F9AC9BC}"/>
+              </a:ext>
+            </a:extLst>
+          </p:cNvPr>
+          <p:cNvSpPr/>
+          <p:nvPr/>
+        </p:nvSpPr>
+        <p:spPr>
+          <a:xfrm>
+            <a:off x="4763386" y="2573079"/>
+            <a:ext cx="5401340" cy="3147237"/>
+          </a:xfrm>
+          <a:prstGeom prst="rect">
+            <a:avLst/>
+          </a:prstGeom>
+          <a:solidFill>
+            <a:srgbClr val="231D28"/>
+          </a:solidFill>
+          <a:ln w="12700" cap="flat">
+            <a:noFill/>
+            <a:miter lim="400000"/>
+          </a:ln>
+          <a:effectLst/>
+          <a:sp3d/>
+        </p:spPr>
+        <p:style>
+          <a:lnRef idx="0">
+            <a:scrgbClr r="0" g="0" b="0"/>
+          </a:lnRef>
+          <a:fillRef idx="0">
+            <a:scrgbClr r="0" g="0" b="0"/>
+          </a:fillRef>
+          <a:effectRef idx="0">
+            <a:scrgbClr r="0" g="0" b="0"/>
+          </a:effectRef>
+          <a:fontRef idx="none"/>
+        </p:style>
+        <p:txBody>
+          <a:bodyPr rot="0" spcFirstLastPara="1" vertOverflow="overflow" horzOverflow="overflow" vert="horz" wrap="square" lIns="50800" tIns="50800" rIns="50800" bIns="50800" numCol="1" spcCol="38100" rtlCol="0" anchor="ctr">
+            <a:spAutoFit/>
+          </a:bodyPr>
+          <a:lstStyle/>
+          <a:p>
+            <a:pPr marL="0" marR="0" indent="0" algn="ctr" defTabSz="825500" rtl="0" fontAlgn="auto" latinLnBrk="0" hangingPunct="0">
+              <a:lnSpc>
+                <a:spcPct val="100000"/>
+              </a:lnSpc>
+              <a:spcBef>
+                <a:spcPts val="0"/>
+              </a:spcBef>
+              <a:spcAft>
+                <a:spcPts val="0"/>
+              </a:spcAft>
+              <a:buClrTx/>
+              <a:buSzTx/>
+              <a:buFontTx/>
+              <a:buNone/>
+              <a:tabLst/>
+            </a:pPr>
+            <a:endParaRPr kumimoji="0" lang="en-US" sz="3200" b="0" i="0" u="none" strike="noStrike" cap="none" spc="0" normalizeH="0" baseline="0">
+              <a:ln>
+                <a:noFill/>
+              </a:ln>
+              <a:solidFill>
+                <a:srgbClr val="FFFFFF"/>
+              </a:solidFill>
+              <a:effectLst/>
+              <a:uFillTx/>
+              <a:latin typeface="+mn-lt"/>
+              <a:ea typeface="+mn-ea"/>
+              <a:cs typeface="+mn-cs"/>
+              <a:sym typeface="Helvetica Light"/>
+            </a:endParaRPr>
+          </a:p>
+        </p:txBody>
+      </p:sp>
+      <p:sp>
+        <p:nvSpPr>
+          <p:cNvPr id="7" name="Left Arrow 6">
+            <a:extLst>
+              <a:ext uri="{FF2B5EF4-FFF2-40B4-BE49-F238E27FC236}">
+                <a16:creationId xmlns:a16="http://schemas.microsoft.com/office/drawing/2014/main" id="{B0072AE8-CD64-5A07-E76B-38DD60D40F5F}"/>
+              </a:ext>
+            </a:extLst>
+          </p:cNvPr>
+          <p:cNvSpPr/>
+          <p:nvPr/>
+        </p:nvSpPr>
+        <p:spPr>
+          <a:xfrm rot="1506728">
+            <a:off x="9885893" y="6048130"/>
+            <a:ext cx="4927600" cy="2438400"/>
+          </a:xfrm>
+          <a:prstGeom prst="leftArrow">
+            <a:avLst/>
+          </a:prstGeom>
+          <a:solidFill>
+            <a:schemeClr val="accent5"/>
+          </a:solidFill>
+          <a:ln w="12700" cap="flat">
+            <a:solidFill>
+              <a:schemeClr val="accent5"/>
+            </a:solidFill>
+            <a:miter lim="400000"/>
+          </a:ln>
+          <a:effectLst>
+            <a:outerShdw blurRad="38100" dist="25400" dir="5400000" rotWithShape="0">
+              <a:srgbClr val="000000">
+                <a:alpha val="50000"/>
+              </a:srgbClr>
+            </a:outerShdw>
+          </a:effectLst>
+          <a:sp3d/>
+        </p:spPr>
+        <p:style>
+          <a:lnRef idx="0">
+            <a:scrgbClr r="0" g="0" b="0"/>
+          </a:lnRef>
+          <a:fillRef idx="0">
+            <a:scrgbClr r="0" g="0" b="0"/>
+          </a:fillRef>
+          <a:effectRef idx="0">
+            <a:scrgbClr r="0" g="0" b="0"/>
+          </a:effectRef>
+          <a:fontRef idx="none"/>
+        </p:style>
+        <p:txBody>
+          <a:bodyPr rot="0" spcFirstLastPara="1" vertOverflow="overflow" horzOverflow="overflow" vert="horz" wrap="square" lIns="50800" tIns="50800" rIns="50800" bIns="50800" numCol="1" spcCol="38100" rtlCol="0" anchor="ctr">
+            <a:spAutoFit/>
+          </a:bodyPr>
+          <a:lstStyle/>
+          <a:p>
+            <a:pPr marL="0" marR="0" indent="0" algn="ctr" defTabSz="825500" rtl="0" fontAlgn="auto" latinLnBrk="0" hangingPunct="0">
+              <a:lnSpc>
+                <a:spcPct val="100000"/>
+              </a:lnSpc>
+              <a:spcBef>
+                <a:spcPts val="0"/>
+              </a:spcBef>
+              <a:spcAft>
+                <a:spcPts val="0"/>
+              </a:spcAft>
+              <a:buClrTx/>
+              <a:buSzTx/>
+              <a:buFontTx/>
+              <a:buNone/>
+              <a:tabLst/>
+            </a:pPr>
+            <a:endParaRPr kumimoji="0" lang="en-US" sz="3200" i="0" u="none" strike="noStrike" normalizeH="0" baseline="0">
+              <a:solidFill>
+                <a:srgbClr val="FFFFFF"/>
+              </a:solidFill>
+              <a:uFillTx/>
+              <a:latin typeface="+mn-lt"/>
+              <a:ea typeface="+mn-ea"/>
+              <a:cs typeface="+mn-cs"/>
+              <a:sym typeface="Helvetica Light"/>
+            </a:endParaRPr>
+          </a:p>
+        </p:txBody>
+      </p:sp>
+      <p:sp>
+        <p:nvSpPr>
+          <p:cNvPr id="8" name="Left Arrow 7">
+            <a:extLst>
+              <a:ext uri="{FF2B5EF4-FFF2-40B4-BE49-F238E27FC236}">
+                <a16:creationId xmlns:a16="http://schemas.microsoft.com/office/drawing/2014/main" id="{4F6E8F3D-5769-1212-079A-892B62AD1D43}"/>
+              </a:ext>
+            </a:extLst>
+          </p:cNvPr>
+          <p:cNvSpPr/>
+          <p:nvPr/>
+        </p:nvSpPr>
+        <p:spPr>
+          <a:xfrm rot="2633121">
+            <a:off x="17414188" y="3732622"/>
+            <a:ext cx="4927600" cy="2438400"/>
+          </a:xfrm>
+          <a:prstGeom prst="leftArrow">
+            <a:avLst/>
+          </a:prstGeom>
+          <a:solidFill>
+            <a:schemeClr val="accent5"/>
+          </a:solidFill>
+          <a:ln w="12700" cap="flat">
+            <a:solidFill>
+              <a:schemeClr val="accent5"/>
+            </a:solidFill>
+            <a:miter lim="400000"/>
+          </a:ln>
+          <a:effectLst>
+            <a:outerShdw blurRad="38100" dist="25400" dir="5400000" rotWithShape="0">
+              <a:srgbClr val="000000">
+                <a:alpha val="50000"/>
+              </a:srgbClr>
+            </a:outerShdw>
+          </a:effectLst>
+          <a:sp3d/>
+        </p:spPr>
+        <p:style>
+          <a:lnRef idx="0">
+            <a:scrgbClr r="0" g="0" b="0"/>
+          </a:lnRef>
+          <a:fillRef idx="0">
+            <a:scrgbClr r="0" g="0" b="0"/>
+          </a:fillRef>
+          <a:effectRef idx="0">
+            <a:scrgbClr r="0" g="0" b="0"/>
+          </a:effectRef>
+          <a:fontRef idx="none"/>
+        </p:style>
+        <p:txBody>
+          <a:bodyPr rot="0" spcFirstLastPara="1" vertOverflow="overflow" horzOverflow="overflow" vert="horz" wrap="square" lIns="50800" tIns="50800" rIns="50800" bIns="50800" numCol="1" spcCol="38100" rtlCol="0" anchor="ctr">
+            <a:spAutoFit/>
+          </a:bodyPr>
+          <a:lstStyle/>
+          <a:p>
+            <a:pPr marL="0" marR="0" indent="0" algn="ctr" defTabSz="825500" rtl="0" fontAlgn="auto" latinLnBrk="0" hangingPunct="0">
+              <a:lnSpc>
+                <a:spcPct val="100000"/>
+              </a:lnSpc>
+              <a:spcBef>
+                <a:spcPts val="0"/>
+              </a:spcBef>
+              <a:spcAft>
+                <a:spcPts val="0"/>
+              </a:spcAft>
+              <a:buClrTx/>
+              <a:buSzTx/>
+              <a:buFontTx/>
+              <a:buNone/>
+              <a:tabLst/>
+            </a:pPr>
+            <a:endParaRPr kumimoji="0" lang="en-US" sz="3200" i="0" u="none" strike="noStrike" normalizeH="0" baseline="0">
+              <a:solidFill>
+                <a:srgbClr val="FFFFFF"/>
+              </a:solidFill>
+              <a:uFillTx/>
+              <a:latin typeface="+mn-lt"/>
+              <a:ea typeface="+mn-ea"/>
+              <a:cs typeface="+mn-cs"/>
+              <a:sym typeface="Helvetica Light"/>
+            </a:endParaRPr>
+          </a:p>
+        </p:txBody>
+      </p:sp>
+      <p:sp>
+        <p:nvSpPr>
+          <p:cNvPr id="13" name="Rectangle 12">
+            <a:extLst>
+              <a:ext uri="{FF2B5EF4-FFF2-40B4-BE49-F238E27FC236}">
+                <a16:creationId xmlns:a16="http://schemas.microsoft.com/office/drawing/2014/main" id="{B120D852-4B3D-BBF2-6336-CBB6234D13B6}"/>
+              </a:ext>
+            </a:extLst>
+          </p:cNvPr>
+          <p:cNvSpPr/>
+          <p:nvPr/>
+        </p:nvSpPr>
+        <p:spPr>
+          <a:xfrm>
+            <a:off x="4763386" y="6358270"/>
+            <a:ext cx="5401340" cy="2530549"/>
+          </a:xfrm>
+          <a:prstGeom prst="rect">
+            <a:avLst/>
+          </a:prstGeom>
+          <a:solidFill>
+            <a:srgbClr val="231D28"/>
+          </a:solidFill>
+          <a:ln w="12700" cap="flat">
+            <a:noFill/>
+            <a:miter lim="400000"/>
+          </a:ln>
+          <a:effectLst/>
+          <a:sp3d/>
+        </p:spPr>
+        <p:style>
+          <a:lnRef idx="0">
+            <a:scrgbClr r="0" g="0" b="0"/>
+          </a:lnRef>
+          <a:fillRef idx="0">
+            <a:scrgbClr r="0" g="0" b="0"/>
+          </a:fillRef>
+          <a:effectRef idx="0">
+            <a:scrgbClr r="0" g="0" b="0"/>
+          </a:effectRef>
+          <a:fontRef idx="none"/>
+        </p:style>
+        <p:txBody>
+          <a:bodyPr rot="0" spcFirstLastPara="1" vertOverflow="overflow" horzOverflow="overflow" vert="horz" wrap="square" lIns="50800" tIns="50800" rIns="50800" bIns="50800" numCol="1" spcCol="38100" rtlCol="0" anchor="ctr">
+            <a:spAutoFit/>
+          </a:bodyPr>
+          <a:lstStyle/>
+          <a:p>
+            <a:pPr marL="0" marR="0" indent="0" algn="ctr" defTabSz="825500" rtl="0" fontAlgn="auto" latinLnBrk="0" hangingPunct="0">
+              <a:lnSpc>
+                <a:spcPct val="100000"/>
+              </a:lnSpc>
+              <a:spcBef>
+                <a:spcPts val="0"/>
+              </a:spcBef>
+              <a:spcAft>
+                <a:spcPts val="0"/>
+              </a:spcAft>
+              <a:buClrTx/>
+              <a:buSzTx/>
+              <a:buFontTx/>
+              <a:buNone/>
+              <a:tabLst/>
+            </a:pPr>
+            <a:endParaRPr kumimoji="0" lang="en-US" sz="3200" b="0" i="0" u="none" strike="noStrike" cap="none" spc="0" normalizeH="0" baseline="0">
+              <a:ln>
+                <a:noFill/>
+              </a:ln>
+              <a:solidFill>
+                <a:srgbClr val="FFFFFF"/>
+              </a:solidFill>
+              <a:effectLst/>
+              <a:uFillTx/>
+              <a:latin typeface="+mn-lt"/>
+              <a:ea typeface="+mn-ea"/>
+              <a:cs typeface="+mn-cs"/>
+              <a:sym typeface="Helvetica Light"/>
+            </a:endParaRPr>
+          </a:p>
+        </p:txBody>
+      </p:sp>
+      <p:sp>
+        <p:nvSpPr>
+          <p:cNvPr id="14" name="TextBox 13">
+            <a:extLst>
+              <a:ext uri="{FF2B5EF4-FFF2-40B4-BE49-F238E27FC236}">
+                <a16:creationId xmlns:a16="http://schemas.microsoft.com/office/drawing/2014/main" id="{AE9D9ED5-1B1A-76E4-D6E0-28B73502C1F2}"/>
+              </a:ext>
+            </a:extLst>
+          </p:cNvPr>
+          <p:cNvSpPr txBox="1"/>
+          <p:nvPr/>
+        </p:nvSpPr>
+        <p:spPr>
+          <a:xfrm>
+            <a:off x="11915149" y="6858000"/>
+            <a:ext cx="871870" cy="872034"/>
+          </a:xfrm>
+          <a:prstGeom prst="rect">
+            <a:avLst/>
+          </a:prstGeom>
+          <a:noFill/>
+          <a:ln w="12700" cap="flat">
+            <a:noFill/>
+            <a:miter lim="400000"/>
+          </a:ln>
+          <a:effectLst/>
+          <a:sp3d/>
+        </p:spPr>
+        <p:style>
+          <a:lnRef idx="0">
+            <a:scrgbClr r="0" g="0" b="0"/>
+          </a:lnRef>
+          <a:fillRef idx="0">
+            <a:scrgbClr r="0" g="0" b="0"/>
+          </a:fillRef>
+          <a:effectRef idx="0">
+            <a:scrgbClr r="0" g="0" b="0"/>
+          </a:effectRef>
+          <a:fontRef idx="none"/>
+        </p:style>
+        <p:txBody>
+          <a:bodyPr rot="0" spcFirstLastPara="1" vertOverflow="overflow" horzOverflow="overflow" vert="horz" wrap="square" lIns="50800" tIns="50800" rIns="50800" bIns="50800" numCol="1" spcCol="38100" rtlCol="0" anchor="ctr">
+            <a:spAutoFit/>
+          </a:bodyPr>
+          <a:lstStyle/>
+          <a:p>
+            <a:pPr marL="0" marR="0" indent="0" algn="ctr" defTabSz="825500" rtl="0" fontAlgn="auto" latinLnBrk="0" hangingPunct="0">
+              <a:lnSpc>
+                <a:spcPct val="100000"/>
+              </a:lnSpc>
+              <a:spcBef>
+                <a:spcPts val="0"/>
+              </a:spcBef>
+              <a:spcAft>
+                <a:spcPts val="0"/>
+              </a:spcAft>
+              <a:buClrTx/>
+              <a:buSzTx/>
+              <a:buFontTx/>
+              <a:buNone/>
+              <a:tabLst/>
+            </a:pPr>
+            <a:r>
+              <a:rPr kumimoji="0" lang="en-US" sz="5000" b="0" i="0" u="none" strike="noStrike" cap="none" spc="0" normalizeH="0" baseline="0" dirty="0">
+                <a:ln>
+                  <a:noFill/>
+                </a:ln>
+                <a:solidFill>
+                  <a:schemeClr val="bg1"/>
+                </a:solidFill>
+                <a:effectLst/>
+                <a:uFillTx/>
+                <a:latin typeface="+mn-lt"/>
+                <a:ea typeface="+mn-ea"/>
+                <a:cs typeface="+mn-cs"/>
+                <a:sym typeface="Helvetica Light"/>
+              </a:rPr>
+              <a:t>1</a:t>
+            </a:r>
+          </a:p>
+        </p:txBody>
+      </p:sp>
+      <p:sp>
+        <p:nvSpPr>
+          <p:cNvPr id="15" name="TextBox 14">
+            <a:extLst>
+              <a:ext uri="{FF2B5EF4-FFF2-40B4-BE49-F238E27FC236}">
+                <a16:creationId xmlns:a16="http://schemas.microsoft.com/office/drawing/2014/main" id="{6318BCDA-6513-0051-931A-43D4497D4791}"/>
+              </a:ext>
+            </a:extLst>
+          </p:cNvPr>
+          <p:cNvSpPr txBox="1"/>
+          <p:nvPr/>
+        </p:nvSpPr>
+        <p:spPr>
+          <a:xfrm>
+            <a:off x="19442053" y="4594994"/>
+            <a:ext cx="871870" cy="872034"/>
+          </a:xfrm>
+          <a:prstGeom prst="rect">
+            <a:avLst/>
+          </a:prstGeom>
+          <a:noFill/>
+          <a:ln w="12700" cap="flat">
+            <a:noFill/>
+            <a:miter lim="400000"/>
+          </a:ln>
+          <a:effectLst/>
+          <a:sp3d/>
+        </p:spPr>
+        <p:style>
+          <a:lnRef idx="0">
+            <a:scrgbClr r="0" g="0" b="0"/>
+          </a:lnRef>
+          <a:fillRef idx="0">
+            <a:scrgbClr r="0" g="0" b="0"/>
+          </a:fillRef>
+          <a:effectRef idx="0">
+            <a:scrgbClr r="0" g="0" b="0"/>
+          </a:effectRef>
+          <a:fontRef idx="none"/>
+        </p:style>
+        <p:txBody>
+          <a:bodyPr rot="0" spcFirstLastPara="1" vertOverflow="overflow" horzOverflow="overflow" vert="horz" wrap="square" lIns="50800" tIns="50800" rIns="50800" bIns="50800" numCol="1" spcCol="38100" rtlCol="0" anchor="ctr">
+            <a:spAutoFit/>
+          </a:bodyPr>
+          <a:lstStyle/>
+          <a:p>
+            <a:pPr marL="0" marR="0" indent="0" algn="ctr" defTabSz="825500" rtl="0" fontAlgn="auto" latinLnBrk="0" hangingPunct="0">
+              <a:lnSpc>
+                <a:spcPct val="100000"/>
+              </a:lnSpc>
+              <a:spcBef>
+                <a:spcPts val="0"/>
+              </a:spcBef>
+              <a:spcAft>
+                <a:spcPts val="0"/>
+              </a:spcAft>
+              <a:buClrTx/>
+              <a:buSzTx/>
+              <a:buFontTx/>
+              <a:buNone/>
+              <a:tabLst/>
+            </a:pPr>
+            <a:r>
+              <a:rPr kumimoji="0" lang="en-US" sz="5000" b="0" i="0" u="none" strike="noStrike" cap="none" spc="0" normalizeH="0" baseline="0" dirty="0">
+                <a:ln>
+                  <a:noFill/>
+                </a:ln>
+                <a:solidFill>
+                  <a:schemeClr val="bg1"/>
+                </a:solidFill>
+                <a:effectLst/>
+                <a:uFillTx/>
+                <a:latin typeface="+mn-lt"/>
+                <a:ea typeface="+mn-ea"/>
+                <a:cs typeface="+mn-cs"/>
+                <a:sym typeface="Helvetica Light"/>
+              </a:rPr>
+              <a:t>3</a:t>
+            </a:r>
+          </a:p>
+        </p:txBody>
+      </p:sp>
+      <p:sp>
+        <p:nvSpPr>
+          <p:cNvPr id="16" name="Left Arrow 15">
+            <a:extLst>
+              <a:ext uri="{FF2B5EF4-FFF2-40B4-BE49-F238E27FC236}">
+                <a16:creationId xmlns:a16="http://schemas.microsoft.com/office/drawing/2014/main" id="{9E37DB0E-AFD3-7FB8-B129-B75A462FCA18}"/>
+              </a:ext>
+            </a:extLst>
+          </p:cNvPr>
+          <p:cNvSpPr/>
+          <p:nvPr/>
+        </p:nvSpPr>
+        <p:spPr>
+          <a:xfrm rot="2633121">
+            <a:off x="13705821" y="4693097"/>
+            <a:ext cx="4927600" cy="2438400"/>
+          </a:xfrm>
+          <a:prstGeom prst="leftArrow">
+            <a:avLst/>
+          </a:prstGeom>
+          <a:solidFill>
+            <a:schemeClr val="accent5"/>
+          </a:solidFill>
+          <a:ln w="12700" cap="flat">
+            <a:solidFill>
+              <a:schemeClr val="accent5"/>
+            </a:solidFill>
+            <a:miter lim="400000"/>
+          </a:ln>
+          <a:effectLst>
+            <a:outerShdw blurRad="38100" dist="25400" dir="5400000" rotWithShape="0">
+              <a:srgbClr val="000000">
+                <a:alpha val="50000"/>
+              </a:srgbClr>
+            </a:outerShdw>
+          </a:effectLst>
+          <a:sp3d/>
+        </p:spPr>
+        <p:style>
+          <a:lnRef idx="0">
+            <a:scrgbClr r="0" g="0" b="0"/>
+          </a:lnRef>
+          <a:fillRef idx="0">
+            <a:scrgbClr r="0" g="0" b="0"/>
+          </a:fillRef>
+          <a:effectRef idx="0">
+            <a:scrgbClr r="0" g="0" b="0"/>
+          </a:effectRef>
+          <a:fontRef idx="none"/>
+        </p:style>
+        <p:txBody>
+          <a:bodyPr rot="0" spcFirstLastPara="1" vertOverflow="overflow" horzOverflow="overflow" vert="horz" wrap="square" lIns="50800" tIns="50800" rIns="50800" bIns="50800" numCol="1" spcCol="38100" rtlCol="0" anchor="ctr">
+            <a:spAutoFit/>
+          </a:bodyPr>
+          <a:lstStyle/>
+          <a:p>
+            <a:pPr marL="0" marR="0" indent="0" algn="ctr" defTabSz="825500" rtl="0" fontAlgn="auto" latinLnBrk="0" hangingPunct="0">
+              <a:lnSpc>
+                <a:spcPct val="100000"/>
+              </a:lnSpc>
+              <a:spcBef>
+                <a:spcPts val="0"/>
+              </a:spcBef>
+              <a:spcAft>
+                <a:spcPts val="0"/>
+              </a:spcAft>
+              <a:buClrTx/>
+              <a:buSzTx/>
+              <a:buFontTx/>
+              <a:buNone/>
+              <a:tabLst/>
+            </a:pPr>
+            <a:endParaRPr kumimoji="0" lang="en-US" sz="3200" i="0" u="none" strike="noStrike" normalizeH="0" baseline="0">
+              <a:solidFill>
+                <a:srgbClr val="FFFFFF"/>
+              </a:solidFill>
+              <a:uFillTx/>
+              <a:latin typeface="+mn-lt"/>
+              <a:ea typeface="+mn-ea"/>
+              <a:cs typeface="+mn-cs"/>
+              <a:sym typeface="Helvetica Light"/>
+            </a:endParaRPr>
+          </a:p>
+        </p:txBody>
+      </p:sp>
+      <p:sp>
+        <p:nvSpPr>
+          <p:cNvPr id="17" name="TextBox 16">
+            <a:extLst>
+              <a:ext uri="{FF2B5EF4-FFF2-40B4-BE49-F238E27FC236}">
+                <a16:creationId xmlns:a16="http://schemas.microsoft.com/office/drawing/2014/main" id="{B3EB988E-690E-289A-C18E-050BC7FF743D}"/>
+              </a:ext>
+            </a:extLst>
+          </p:cNvPr>
+          <p:cNvSpPr txBox="1"/>
+          <p:nvPr/>
+        </p:nvSpPr>
+        <p:spPr>
+          <a:xfrm>
+            <a:off x="15733686" y="5555469"/>
+            <a:ext cx="871870" cy="872034"/>
+          </a:xfrm>
+          <a:prstGeom prst="rect">
+            <a:avLst/>
+          </a:prstGeom>
+          <a:noFill/>
+          <a:ln w="12700" cap="flat">
+            <a:noFill/>
+            <a:miter lim="400000"/>
+          </a:ln>
+          <a:effectLst/>
+          <a:sp3d/>
+        </p:spPr>
+        <p:style>
+          <a:lnRef idx="0">
+            <a:scrgbClr r="0" g="0" b="0"/>
+          </a:lnRef>
+          <a:fillRef idx="0">
+            <a:scrgbClr r="0" g="0" b="0"/>
+          </a:fillRef>
+          <a:effectRef idx="0">
+            <a:scrgbClr r="0" g="0" b="0"/>
+          </a:effectRef>
+          <a:fontRef idx="none"/>
+        </p:style>
+        <p:txBody>
+          <a:bodyPr rot="0" spcFirstLastPara="1" vertOverflow="overflow" horzOverflow="overflow" vert="horz" wrap="square" lIns="50800" tIns="50800" rIns="50800" bIns="50800" numCol="1" spcCol="38100" rtlCol="0" anchor="ctr">
+            <a:spAutoFit/>
+          </a:bodyPr>
+          <a:lstStyle/>
+          <a:p>
+            <a:pPr marL="0" marR="0" indent="0" algn="ctr" defTabSz="825500" rtl="0" fontAlgn="auto" latinLnBrk="0" hangingPunct="0">
+              <a:lnSpc>
+                <a:spcPct val="100000"/>
+              </a:lnSpc>
+              <a:spcBef>
+                <a:spcPts val="0"/>
+              </a:spcBef>
+              <a:spcAft>
+                <a:spcPts val="0"/>
+              </a:spcAft>
+              <a:buClrTx/>
+              <a:buSzTx/>
+              <a:buFontTx/>
+              <a:buNone/>
+              <a:tabLst/>
+            </a:pPr>
+            <a:r>
+              <a:rPr lang="en-US" dirty="0">
+                <a:solidFill>
+                  <a:schemeClr val="bg1"/>
+                </a:solidFill>
+              </a:rPr>
+              <a:t>4</a:t>
+            </a:r>
+            <a:endParaRPr kumimoji="0" lang="en-US" sz="5000" b="0" i="0" u="none" strike="noStrike" cap="none" spc="0" normalizeH="0" baseline="0" dirty="0">
+              <a:ln>
+                <a:noFill/>
+              </a:ln>
+              <a:solidFill>
+                <a:schemeClr val="bg1"/>
+              </a:solidFill>
+              <a:effectLst/>
+              <a:uFillTx/>
+              <a:latin typeface="+mn-lt"/>
+              <a:ea typeface="+mn-ea"/>
+              <a:cs typeface="+mn-cs"/>
+              <a:sym typeface="Helvetica Light"/>
+            </a:endParaRPr>
+          </a:p>
+        </p:txBody>
+      </p:sp>
+      <p:sp>
+        <p:nvSpPr>
+          <p:cNvPr id="11" name="Left Arrow 10">
+            <a:extLst>
+              <a:ext uri="{FF2B5EF4-FFF2-40B4-BE49-F238E27FC236}">
+                <a16:creationId xmlns:a16="http://schemas.microsoft.com/office/drawing/2014/main" id="{FC4165B6-7687-0911-2D91-5935AFCB272B}"/>
+              </a:ext>
+            </a:extLst>
+          </p:cNvPr>
+          <p:cNvSpPr/>
+          <p:nvPr/>
+        </p:nvSpPr>
+        <p:spPr>
+          <a:xfrm rot="10800000">
+            <a:off x="5562891" y="2179573"/>
+            <a:ext cx="4927600" cy="2438400"/>
+          </a:xfrm>
+          <a:prstGeom prst="leftArrow">
+            <a:avLst/>
+          </a:prstGeom>
+          <a:solidFill>
+            <a:schemeClr val="accent5"/>
+          </a:solidFill>
+          <a:ln w="12700" cap="flat">
+            <a:solidFill>
+              <a:schemeClr val="accent5"/>
+            </a:solidFill>
+            <a:miter lim="400000"/>
+          </a:ln>
+          <a:effectLst>
+            <a:outerShdw blurRad="38100" dist="25400" dir="5400000" rotWithShape="0">
+              <a:srgbClr val="000000">
+                <a:alpha val="50000"/>
+              </a:srgbClr>
+            </a:outerShdw>
+          </a:effectLst>
+          <a:sp3d/>
+        </p:spPr>
+        <p:style>
+          <a:lnRef idx="0">
+            <a:scrgbClr r="0" g="0" b="0"/>
+          </a:lnRef>
+          <a:fillRef idx="0">
+            <a:scrgbClr r="0" g="0" b="0"/>
+          </a:fillRef>
+          <a:effectRef idx="0">
+            <a:scrgbClr r="0" g="0" b="0"/>
+          </a:effectRef>
+          <a:fontRef idx="none"/>
+        </p:style>
+        <p:txBody>
+          <a:bodyPr rot="0" spcFirstLastPara="1" vertOverflow="overflow" horzOverflow="overflow" vert="horz" wrap="square" lIns="50800" tIns="50800" rIns="50800" bIns="50800" numCol="1" spcCol="38100" rtlCol="0" anchor="ctr">
+            <a:spAutoFit/>
+          </a:bodyPr>
+          <a:lstStyle/>
+          <a:p>
+            <a:pPr marL="0" marR="0" indent="0" algn="ctr" defTabSz="825500" rtl="0" fontAlgn="auto" latinLnBrk="0" hangingPunct="0">
+              <a:lnSpc>
+                <a:spcPct val="100000"/>
+              </a:lnSpc>
+              <a:spcBef>
+                <a:spcPts val="0"/>
+              </a:spcBef>
+              <a:spcAft>
+                <a:spcPts val="0"/>
+              </a:spcAft>
+              <a:buClrTx/>
+              <a:buSzTx/>
+              <a:buFontTx/>
+              <a:buNone/>
+              <a:tabLst/>
+            </a:pPr>
+            <a:endParaRPr kumimoji="0" lang="en-US" sz="3200" i="0" u="none" strike="noStrike" normalizeH="0" baseline="0">
+              <a:solidFill>
+                <a:srgbClr val="FFFFFF"/>
+              </a:solidFill>
+              <a:uFillTx/>
+              <a:latin typeface="+mn-lt"/>
+              <a:ea typeface="+mn-ea"/>
+              <a:cs typeface="+mn-cs"/>
+              <a:sym typeface="Helvetica Light"/>
+            </a:endParaRPr>
+          </a:p>
+        </p:txBody>
+      </p:sp>
+      <p:sp>
+        <p:nvSpPr>
+          <p:cNvPr id="18" name="TextBox 17">
+            <a:extLst>
+              <a:ext uri="{FF2B5EF4-FFF2-40B4-BE49-F238E27FC236}">
+                <a16:creationId xmlns:a16="http://schemas.microsoft.com/office/drawing/2014/main" id="{554BD10A-F618-2144-4852-19D9F4786D1C}"/>
+              </a:ext>
+            </a:extLst>
+          </p:cNvPr>
+          <p:cNvSpPr txBox="1"/>
+          <p:nvPr/>
+        </p:nvSpPr>
+        <p:spPr>
+          <a:xfrm>
+            <a:off x="7314309" y="2962756"/>
+            <a:ext cx="871870" cy="872034"/>
+          </a:xfrm>
+          <a:prstGeom prst="rect">
+            <a:avLst/>
+          </a:prstGeom>
+          <a:noFill/>
+          <a:ln w="12700" cap="flat">
+            <a:noFill/>
+            <a:miter lim="400000"/>
+          </a:ln>
+          <a:effectLst/>
+          <a:sp3d/>
+        </p:spPr>
+        <p:style>
+          <a:lnRef idx="0">
+            <a:scrgbClr r="0" g="0" b="0"/>
+          </a:lnRef>
+          <a:fillRef idx="0">
+            <a:scrgbClr r="0" g="0" b="0"/>
+          </a:fillRef>
+          <a:effectRef idx="0">
+            <a:scrgbClr r="0" g="0" b="0"/>
+          </a:effectRef>
+          <a:fontRef idx="none"/>
+        </p:style>
+        <p:txBody>
+          <a:bodyPr rot="0" spcFirstLastPara="1" vertOverflow="overflow" horzOverflow="overflow" vert="horz" wrap="square" lIns="50800" tIns="50800" rIns="50800" bIns="50800" numCol="1" spcCol="38100" rtlCol="0" anchor="ctr">
+            <a:spAutoFit/>
+          </a:bodyPr>
+          <a:lstStyle/>
+          <a:p>
+            <a:pPr marL="0" marR="0" indent="0" algn="ctr" defTabSz="825500" rtl="0" fontAlgn="auto" latinLnBrk="0" hangingPunct="0">
+              <a:lnSpc>
+                <a:spcPct val="100000"/>
+              </a:lnSpc>
+              <a:spcBef>
+                <a:spcPts val="0"/>
+              </a:spcBef>
+              <a:spcAft>
+                <a:spcPts val="0"/>
+              </a:spcAft>
+              <a:buClrTx/>
+              <a:buSzTx/>
+              <a:buFontTx/>
+              <a:buNone/>
+              <a:tabLst/>
+            </a:pPr>
+            <a:r>
+              <a:rPr lang="en-US" dirty="0">
+                <a:solidFill>
+                  <a:schemeClr val="bg1"/>
+                </a:solidFill>
+              </a:rPr>
+              <a:t>2</a:t>
+            </a:r>
+            <a:endParaRPr kumimoji="0" lang="en-US" sz="5000" b="0" i="0" u="none" strike="noStrike" cap="none" spc="0" normalizeH="0" baseline="0" dirty="0">
+              <a:ln>
+                <a:noFill/>
+              </a:ln>
+              <a:solidFill>
+                <a:schemeClr val="bg1"/>
+              </a:solidFill>
+              <a:effectLst/>
+              <a:uFillTx/>
+              <a:latin typeface="+mn-lt"/>
+              <a:ea typeface="+mn-ea"/>
+              <a:cs typeface="+mn-cs"/>
+              <a:sym typeface="Helvetica Light"/>
+            </a:endParaRPr>
+          </a:p>
+        </p:txBody>
+      </p:sp>
+    </p:spTree>
+    <p:extLst>
+      <p:ext uri="{BB962C8B-B14F-4D97-AF65-F5344CB8AC3E}">
+        <p14:creationId xmlns:p14="http://schemas.microsoft.com/office/powerpoint/2010/main" val="510975305"/>
+      </p:ext>
+    </p:extLst>
+  </p:cSld>
+  <p:clrMapOvr>
+    <a:masterClrMapping/>
+  </p:clrMapOvr>
+  <p:transition spd="med"/>
+</p:sld>
+</file>
+
+<file path=ppt/slides/slide15.xml><?xml version="1.0" encoding="utf-8"?>
+<p:sld xmlns:a="http://schemas.openxmlformats.org/drawingml/2006/main" xmlns:r="http://schemas.openxmlformats.org/officeDocument/2006/relationships" xmlns:p="http://schemas.openxmlformats.org/presentationml/2006/main">
+  <p:cSld>
+    <p:spTree>
+      <p:nvGrpSpPr>
+        <p:cNvPr id="1" name=""/>
+        <p:cNvGrpSpPr/>
+        <p:nvPr/>
+      </p:nvGrpSpPr>
+      <p:grpSpPr>
+        <a:xfrm>
+          <a:off x="0" y="0"/>
+          <a:ext cx="0" cy="0"/>
+          <a:chOff x="0" y="0"/>
+          <a:chExt cx="0" cy="0"/>
+        </a:xfrm>
+      </p:grpSpPr>
+      <p:pic>
+        <p:nvPicPr>
+          <p:cNvPr id="5" name="Picture 4" descr="A screenshot of a computer screen&#10;&#10;Description automatically generated with medium confidence">
+            <a:extLst>
+              <a:ext uri="{FF2B5EF4-FFF2-40B4-BE49-F238E27FC236}">
+                <a16:creationId xmlns:a16="http://schemas.microsoft.com/office/drawing/2014/main" id="{E8FE74CF-7337-CFF9-727C-58A07B6B3E7F}"/>
+              </a:ext>
+            </a:extLst>
+          </p:cNvPr>
+          <p:cNvPicPr>
+            <a:picLocks noChangeAspect="1"/>
+          </p:cNvPicPr>
+          <p:nvPr/>
+        </p:nvPicPr>
+        <p:blipFill>
+          <a:blip r:embed="rId3">
+            <a:extLst>
+              <a:ext uri="{28A0092B-C50C-407E-A947-70E740481C1C}">
+                <a14:useLocalDpi xmlns:a14="http://schemas.microsoft.com/office/drawing/2010/main" val="0"/>
+              </a:ext>
+            </a:extLst>
+          </a:blip>
+          <a:stretch>
+            <a:fillRect/>
+          </a:stretch>
+        </p:blipFill>
+        <p:spPr>
+          <a:xfrm>
+            <a:off x="-9904" y="2259106"/>
+            <a:ext cx="24403808" cy="9197788"/>
+          </a:xfrm>
+          <a:prstGeom prst="rect">
+            <a:avLst/>
+          </a:prstGeom>
+        </p:spPr>
+      </p:pic>
+    </p:spTree>
+    <p:extLst>
+      <p:ext uri="{BB962C8B-B14F-4D97-AF65-F5344CB8AC3E}">
+        <p14:creationId xmlns:p14="http://schemas.microsoft.com/office/powerpoint/2010/main" val="531057688"/>
+      </p:ext>
+    </p:extLst>
+  </p:cSld>
+  <p:clrMapOvr>
+    <a:masterClrMapping/>
+  </p:clrMapOvr>
+  <p:transition spd="med"/>
+</p:sld>
+</file>
+
+<file path=ppt/slides/slide16.xml><?xml version="1.0" encoding="utf-8"?>
+<p:sld xmlns:a="http://schemas.openxmlformats.org/drawingml/2006/main" xmlns:r="http://schemas.openxmlformats.org/officeDocument/2006/relationships" xmlns:p="http://schemas.openxmlformats.org/presentationml/2006/main">
+  <p:cSld>
+    <p:spTree>
+      <p:nvGrpSpPr>
+        <p:cNvPr id="1" name=""/>
+        <p:cNvGrpSpPr/>
+        <p:nvPr/>
+      </p:nvGrpSpPr>
+      <p:grpSpPr>
+        <a:xfrm>
+          <a:off x="0" y="0"/>
+          <a:ext cx="0" cy="0"/>
+          <a:chOff x="0" y="0"/>
+          <a:chExt cx="0" cy="0"/>
+        </a:xfrm>
+      </p:grpSpPr>
+      <p:pic>
+        <p:nvPicPr>
+          <p:cNvPr id="3" name="Picture 2" descr="Graphical user interface, application&#10;&#10;Description automatically generated">
+            <a:extLst>
+              <a:ext uri="{FF2B5EF4-FFF2-40B4-BE49-F238E27FC236}">
+                <a16:creationId xmlns:a16="http://schemas.microsoft.com/office/drawing/2014/main" id="{15F77813-8BE6-1305-F80A-334B43B1D248}"/>
+              </a:ext>
+            </a:extLst>
+          </p:cNvPr>
+          <p:cNvPicPr>
+            <a:picLocks noChangeAspect="1"/>
+          </p:cNvPicPr>
+          <p:nvPr/>
+        </p:nvPicPr>
+        <p:blipFill>
+          <a:blip r:embed="rId3">
+            <a:extLst>
+              <a:ext uri="{28A0092B-C50C-407E-A947-70E740481C1C}">
+                <a14:useLocalDpi xmlns:a14="http://schemas.microsoft.com/office/drawing/2010/main" val="0"/>
+              </a:ext>
+            </a:extLst>
+          </a:blip>
+          <a:stretch>
+            <a:fillRect/>
+          </a:stretch>
+        </p:blipFill>
+        <p:spPr>
+          <a:xfrm>
+            <a:off x="3016103" y="8848"/>
+            <a:ext cx="18351795" cy="13698304"/>
+          </a:xfrm>
+          <a:prstGeom prst="rect">
+            <a:avLst/>
+          </a:prstGeom>
+        </p:spPr>
+      </p:pic>
+    </p:spTree>
+    <p:extLst>
+      <p:ext uri="{BB962C8B-B14F-4D97-AF65-F5344CB8AC3E}">
+        <p14:creationId xmlns:p14="http://schemas.microsoft.com/office/powerpoint/2010/main" val="3887773943"/>
       </p:ext>
     </p:extLst>
   </p:cSld>
@@ -3767,8 +5722,8 @@
         </p:nvSpPr>
         <p:spPr>
           <a:xfrm>
-            <a:off x="14525688" y="4140200"/>
-            <a:ext cx="9618360" cy="5435601"/>
+            <a:off x="14525688" y="3344218"/>
+            <a:ext cx="9618360" cy="7027565"/>
           </a:xfrm>
           <a:prstGeom prst="rect">
             <a:avLst/>
@@ -3778,7 +5733,7 @@
           </a:ln>
           <a:extLst>
             <a:ext uri="{C572A759-6A51-4108-AA02-DFA0A04FC94B}">
-              <ma14:wrappingTextBoxFlag xmlns="" xmlns:m="http://schemas.openxmlformats.org/officeDocument/2006/math" xmlns:a14="http://schemas.microsoft.com/office/drawing/2010/main" xmlns:ma14="http://schemas.microsoft.com/office/mac/drawingml/2011/main" val="1"/>
+              <ma14:wrappingTextBoxFlag xmlns:ma14="http://schemas.microsoft.com/office/mac/drawingml/2011/main" xmlns:a14="http://schemas.microsoft.com/office/drawing/2010/main" xmlns:m="http://schemas.openxmlformats.org/officeDocument/2006/math" xmlns="" val="1"/>
             </a:ext>
           </a:extLst>
         </p:spPr>
@@ -3793,8 +5748,22 @@
               <a:buAutoNum type="arabicPeriod"/>
             </a:pPr>
             <a:r>
+              <a:rPr lang="en-US" dirty="0"/>
+              <a:t>Start at home</a:t>
+            </a:r>
+          </a:p>
+          <a:p>
+            <a:pPr marL="854807" indent="-854807" algn="l">
+              <a:buSzPct val="100000"/>
+              <a:buAutoNum type="arabicPeriod"/>
+            </a:pPr>
+            <a:r>
+              <a:rPr lang="en-US" dirty="0"/>
+              <a:t>Turn r</a:t>
+            </a:r>
+            <a:r>
               <a:rPr dirty="0"/>
-              <a:t>Right on Camp Bowie Blvd.</a:t>
+              <a:t>ight on Camp Bowie Blvd.</a:t>
             </a:r>
           </a:p>
           <a:p>
@@ -3813,8 +5782,12 @@
               <a:buAutoNum type="arabicPeriod"/>
             </a:pPr>
             <a:r>
+              <a:rPr lang="en-US" dirty="0"/>
+              <a:t>Turn l</a:t>
+            </a:r>
+            <a:r>
               <a:rPr dirty="0"/>
-              <a:t>Left on </a:t>
+              <a:t>eft on </a:t>
             </a:r>
             <a:r>
               <a:rPr dirty="0" err="1"/>

</xml_diff>